<commit_message>
Concertarmos os erros para gerar certificados.
</commit_message>
<xml_diff>
--- a/sistema-seven/web/resources/template.pptx
+++ b/sistema-seven/web/resources/template.pptx
@@ -53,7 +53,7 @@
       </p:grpSpPr>
       <p:sp>
         <p:nvSpPr>
-          <p:cNvPr id="26" name="PlaceHolder 1"/>
+          <p:cNvPr id="23" name="PlaceHolder 1"/>
           <p:cNvSpPr>
             <a:spLocks noGrp="1"/>
           </p:cNvSpPr>
@@ -64,22 +64,23 @@
         <p:spPr>
           <a:xfrm>
             <a:off x="685800" y="2130480"/>
-            <a:ext cx="7772040" cy="1469880"/>
-          </a:xfrm>
-          <a:prstGeom prst="rect">
-            <a:avLst/>
-          </a:prstGeom>
-        </p:spPr>
-        <p:txBody>
-          <a:bodyPr wrap="none" lIns="0" rIns="0" tIns="0" bIns="0" anchor="ctr"/>
-          <a:p>
-            <a:endParaRPr/>
-          </a:p>
-        </p:txBody>
-      </p:sp>
-      <p:sp>
-        <p:nvSpPr>
-          <p:cNvPr id="27" name="PlaceHolder 2"/>
+            <a:ext cx="7771680" cy="1469880"/>
+          </a:xfrm>
+          <a:prstGeom prst="rect">
+            <a:avLst/>
+          </a:prstGeom>
+        </p:spPr>
+        <p:txBody>
+          <a:bodyPr lIns="0" rIns="0" tIns="0" bIns="0" anchor="ctr"/>
+          <a:p>
+            <a:pPr algn="ctr"/>
+            <a:endParaRPr/>
+          </a:p>
+        </p:txBody>
+      </p:sp>
+      <p:sp>
+        <p:nvSpPr>
+          <p:cNvPr id="24" name="PlaceHolder 2"/>
           <p:cNvSpPr>
             <a:spLocks noGrp="1"/>
           </p:cNvSpPr>
@@ -97,15 +98,15 @@
           </a:prstGeom>
         </p:spPr>
         <p:txBody>
-          <a:bodyPr wrap="none" lIns="0" rIns="0" tIns="0" bIns="0"/>
-          <a:p>
-            <a:endParaRPr/>
-          </a:p>
-        </p:txBody>
-      </p:sp>
-      <p:sp>
-        <p:nvSpPr>
-          <p:cNvPr id="28" name="PlaceHolder 3"/>
+          <a:bodyPr lIns="0" rIns="0" tIns="0" bIns="0"/>
+          <a:p>
+            <a:endParaRPr/>
+          </a:p>
+        </p:txBody>
+      </p:sp>
+      <p:sp>
+        <p:nvSpPr>
+          <p:cNvPr id="25" name="PlaceHolder 3"/>
           <p:cNvSpPr>
             <a:spLocks noGrp="1"/>
           </p:cNvSpPr>
@@ -123,7 +124,7 @@
           </a:prstGeom>
         </p:spPr>
         <p:txBody>
-          <a:bodyPr wrap="none" lIns="0" rIns="0" tIns="0" bIns="0"/>
+          <a:bodyPr lIns="0" rIns="0" tIns="0" bIns="0"/>
           <a:p>
             <a:endParaRPr/>
           </a:p>
@@ -153,7 +154,7 @@
       </p:grpSpPr>
       <p:sp>
         <p:nvSpPr>
-          <p:cNvPr id="29" name="PlaceHolder 1"/>
+          <p:cNvPr id="26" name="PlaceHolder 1"/>
           <p:cNvSpPr>
             <a:spLocks noGrp="1"/>
           </p:cNvSpPr>
@@ -164,22 +165,23 @@
         <p:spPr>
           <a:xfrm>
             <a:off x="685800" y="2130480"/>
-            <a:ext cx="7772040" cy="1469880"/>
-          </a:xfrm>
-          <a:prstGeom prst="rect">
-            <a:avLst/>
-          </a:prstGeom>
-        </p:spPr>
-        <p:txBody>
-          <a:bodyPr wrap="none" lIns="0" rIns="0" tIns="0" bIns="0" anchor="ctr"/>
-          <a:p>
-            <a:endParaRPr/>
-          </a:p>
-        </p:txBody>
-      </p:sp>
-      <p:sp>
-        <p:nvSpPr>
-          <p:cNvPr id="30" name="PlaceHolder 2"/>
+            <a:ext cx="7771680" cy="1469880"/>
+          </a:xfrm>
+          <a:prstGeom prst="rect">
+            <a:avLst/>
+          </a:prstGeom>
+        </p:spPr>
+        <p:txBody>
+          <a:bodyPr lIns="0" rIns="0" tIns="0" bIns="0" anchor="ctr"/>
+          <a:p>
+            <a:pPr algn="ctr"/>
+            <a:endParaRPr/>
+          </a:p>
+        </p:txBody>
+      </p:sp>
+      <p:sp>
+        <p:nvSpPr>
+          <p:cNvPr id="27" name="PlaceHolder 2"/>
           <p:cNvSpPr>
             <a:spLocks noGrp="1"/>
           </p:cNvSpPr>
@@ -197,15 +199,15 @@
           </a:prstGeom>
         </p:spPr>
         <p:txBody>
-          <a:bodyPr wrap="none" lIns="0" rIns="0" tIns="0" bIns="0"/>
-          <a:p>
-            <a:endParaRPr/>
-          </a:p>
-        </p:txBody>
-      </p:sp>
-      <p:sp>
-        <p:nvSpPr>
-          <p:cNvPr id="31" name="PlaceHolder 3"/>
+          <a:bodyPr lIns="0" rIns="0" tIns="0" bIns="0"/>
+          <a:p>
+            <a:endParaRPr/>
+          </a:p>
+        </p:txBody>
+      </p:sp>
+      <p:sp>
+        <p:nvSpPr>
+          <p:cNvPr id="28" name="PlaceHolder 3"/>
           <p:cNvSpPr>
             <a:spLocks noGrp="1"/>
           </p:cNvSpPr>
@@ -223,15 +225,15 @@
           </a:prstGeom>
         </p:spPr>
         <p:txBody>
-          <a:bodyPr wrap="none" lIns="0" rIns="0" tIns="0" bIns="0"/>
-          <a:p>
-            <a:endParaRPr/>
-          </a:p>
-        </p:txBody>
-      </p:sp>
-      <p:sp>
-        <p:nvSpPr>
-          <p:cNvPr id="32" name="PlaceHolder 4"/>
+          <a:bodyPr lIns="0" rIns="0" tIns="0" bIns="0"/>
+          <a:p>
+            <a:endParaRPr/>
+          </a:p>
+        </p:txBody>
+      </p:sp>
+      <p:sp>
+        <p:nvSpPr>
+          <p:cNvPr id="29" name="PlaceHolder 4"/>
           <p:cNvSpPr>
             <a:spLocks noGrp="1"/>
           </p:cNvSpPr>
@@ -249,15 +251,15 @@
           </a:prstGeom>
         </p:spPr>
         <p:txBody>
-          <a:bodyPr wrap="none" lIns="0" rIns="0" tIns="0" bIns="0"/>
-          <a:p>
-            <a:endParaRPr/>
-          </a:p>
-        </p:txBody>
-      </p:sp>
-      <p:sp>
-        <p:nvSpPr>
-          <p:cNvPr id="33" name="PlaceHolder 5"/>
+          <a:bodyPr lIns="0" rIns="0" tIns="0" bIns="0"/>
+          <a:p>
+            <a:endParaRPr/>
+          </a:p>
+        </p:txBody>
+      </p:sp>
+      <p:sp>
+        <p:nvSpPr>
+          <p:cNvPr id="30" name="PlaceHolder 5"/>
           <p:cNvSpPr>
             <a:spLocks noGrp="1"/>
           </p:cNvSpPr>
@@ -275,7 +277,7 @@
           </a:prstGeom>
         </p:spPr>
         <p:txBody>
-          <a:bodyPr wrap="none" lIns="0" rIns="0" tIns="0" bIns="0"/>
+          <a:bodyPr lIns="0" rIns="0" tIns="0" bIns="0"/>
           <a:p>
             <a:endParaRPr/>
           </a:p>
@@ -305,7 +307,7 @@
       </p:grpSpPr>
       <p:sp>
         <p:nvSpPr>
-          <p:cNvPr id="34" name="PlaceHolder 1"/>
+          <p:cNvPr id="31" name="PlaceHolder 1"/>
           <p:cNvSpPr>
             <a:spLocks noGrp="1"/>
           </p:cNvSpPr>
@@ -316,22 +318,23 @@
         <p:spPr>
           <a:xfrm>
             <a:off x="685800" y="2130480"/>
-            <a:ext cx="7772040" cy="1469880"/>
-          </a:xfrm>
-          <a:prstGeom prst="rect">
-            <a:avLst/>
-          </a:prstGeom>
-        </p:spPr>
-        <p:txBody>
-          <a:bodyPr wrap="none" lIns="0" rIns="0" tIns="0" bIns="0" anchor="ctr"/>
-          <a:p>
-            <a:endParaRPr/>
-          </a:p>
-        </p:txBody>
-      </p:sp>
-      <p:sp>
-        <p:nvSpPr>
-          <p:cNvPr id="35" name="PlaceHolder 2"/>
+            <a:ext cx="7771680" cy="1469880"/>
+          </a:xfrm>
+          <a:prstGeom prst="rect">
+            <a:avLst/>
+          </a:prstGeom>
+        </p:spPr>
+        <p:txBody>
+          <a:bodyPr lIns="0" rIns="0" tIns="0" bIns="0" anchor="ctr"/>
+          <a:p>
+            <a:pPr algn="ctr"/>
+            <a:endParaRPr/>
+          </a:p>
+        </p:txBody>
+      </p:sp>
+      <p:sp>
+        <p:nvSpPr>
+          <p:cNvPr id="32" name="PlaceHolder 2"/>
           <p:cNvSpPr>
             <a:spLocks noGrp="1"/>
           </p:cNvSpPr>
@@ -349,15 +352,15 @@
           </a:prstGeom>
         </p:spPr>
         <p:txBody>
-          <a:bodyPr wrap="none" lIns="0" rIns="0" tIns="0" bIns="0"/>
-          <a:p>
-            <a:endParaRPr/>
-          </a:p>
-        </p:txBody>
-      </p:sp>
-      <p:sp>
-        <p:nvSpPr>
-          <p:cNvPr id="36" name="PlaceHolder 3"/>
+          <a:bodyPr lIns="0" rIns="0" tIns="0" bIns="0"/>
+          <a:p>
+            <a:endParaRPr/>
+          </a:p>
+        </p:txBody>
+      </p:sp>
+      <p:sp>
+        <p:nvSpPr>
+          <p:cNvPr id="33" name="PlaceHolder 3"/>
           <p:cNvSpPr>
             <a:spLocks noGrp="1"/>
           </p:cNvSpPr>
@@ -375,7 +378,7 @@
           </a:prstGeom>
         </p:spPr>
         <p:txBody>
-          <a:bodyPr wrap="none" lIns="0" rIns="0" tIns="0" bIns="0"/>
+          <a:bodyPr lIns="0" rIns="0" tIns="0" bIns="0"/>
           <a:p>
             <a:endParaRPr/>
           </a:p>
@@ -383,7 +386,7 @@
       </p:sp>
       <p:pic>
         <p:nvPicPr>
-          <p:cNvPr id="37" name="" descr=""/>
+          <p:cNvPr id="34" name="" descr=""/>
           <p:cNvPicPr/>
           <p:nvPr/>
         </p:nvPicPr>
@@ -408,7 +411,7 @@
       </p:pic>
       <p:pic>
         <p:nvPicPr>
-          <p:cNvPr id="38" name="" descr=""/>
+          <p:cNvPr id="35" name="" descr=""/>
           <p:cNvPicPr/>
           <p:nvPr/>
         </p:nvPicPr>
@@ -455,7 +458,7 @@
       </p:grpSpPr>
       <p:sp>
         <p:nvSpPr>
-          <p:cNvPr id="5" name="PlaceHolder 1"/>
+          <p:cNvPr id="2" name="PlaceHolder 1"/>
           <p:cNvSpPr>
             <a:spLocks noGrp="1"/>
           </p:cNvSpPr>
@@ -466,22 +469,23 @@
         <p:spPr>
           <a:xfrm>
             <a:off x="685800" y="2130480"/>
-            <a:ext cx="7772040" cy="1469880"/>
-          </a:xfrm>
-          <a:prstGeom prst="rect">
-            <a:avLst/>
-          </a:prstGeom>
-        </p:spPr>
-        <p:txBody>
-          <a:bodyPr wrap="none" lIns="0" rIns="0" tIns="0" bIns="0" anchor="ctr"/>
-          <a:p>
-            <a:endParaRPr/>
-          </a:p>
-        </p:txBody>
-      </p:sp>
-      <p:sp>
-        <p:nvSpPr>
-          <p:cNvPr id="6" name="PlaceHolder 2"/>
+            <a:ext cx="7771680" cy="1469880"/>
+          </a:xfrm>
+          <a:prstGeom prst="rect">
+            <a:avLst/>
+          </a:prstGeom>
+        </p:spPr>
+        <p:txBody>
+          <a:bodyPr lIns="0" rIns="0" tIns="0" bIns="0" anchor="ctr"/>
+          <a:p>
+            <a:pPr algn="ctr"/>
+            <a:endParaRPr/>
+          </a:p>
+        </p:txBody>
+      </p:sp>
+      <p:sp>
+        <p:nvSpPr>
+          <p:cNvPr id="3" name="PlaceHolder 2"/>
           <p:cNvSpPr>
             <a:spLocks noGrp="1"/>
           </p:cNvSpPr>
@@ -499,7 +503,7 @@
           </a:prstGeom>
         </p:spPr>
         <p:txBody>
-          <a:bodyPr wrap="none" lIns="0" rIns="0" tIns="0" bIns="0" anchor="ctr"/>
+          <a:bodyPr lIns="0" rIns="0" tIns="0" bIns="0" anchor="ctr"/>
           <a:p>
             <a:pPr algn="ctr"/>
             <a:endParaRPr/>
@@ -530,7 +534,7 @@
       </p:grpSpPr>
       <p:sp>
         <p:nvSpPr>
-          <p:cNvPr id="7" name="PlaceHolder 1"/>
+          <p:cNvPr id="4" name="PlaceHolder 1"/>
           <p:cNvSpPr>
             <a:spLocks noGrp="1"/>
           </p:cNvSpPr>
@@ -541,22 +545,23 @@
         <p:spPr>
           <a:xfrm>
             <a:off x="685800" y="2130480"/>
-            <a:ext cx="7772040" cy="1469880"/>
-          </a:xfrm>
-          <a:prstGeom prst="rect">
-            <a:avLst/>
-          </a:prstGeom>
-        </p:spPr>
-        <p:txBody>
-          <a:bodyPr wrap="none" lIns="0" rIns="0" tIns="0" bIns="0" anchor="ctr"/>
-          <a:p>
-            <a:endParaRPr/>
-          </a:p>
-        </p:txBody>
-      </p:sp>
-      <p:sp>
-        <p:nvSpPr>
-          <p:cNvPr id="8" name="PlaceHolder 2"/>
+            <a:ext cx="7771680" cy="1469880"/>
+          </a:xfrm>
+          <a:prstGeom prst="rect">
+            <a:avLst/>
+          </a:prstGeom>
+        </p:spPr>
+        <p:txBody>
+          <a:bodyPr lIns="0" rIns="0" tIns="0" bIns="0" anchor="ctr"/>
+          <a:p>
+            <a:pPr algn="ctr"/>
+            <a:endParaRPr/>
+          </a:p>
+        </p:txBody>
+      </p:sp>
+      <p:sp>
+        <p:nvSpPr>
+          <p:cNvPr id="5" name="PlaceHolder 2"/>
           <p:cNvSpPr>
             <a:spLocks noGrp="1"/>
           </p:cNvSpPr>
@@ -574,7 +579,7 @@
           </a:prstGeom>
         </p:spPr>
         <p:txBody>
-          <a:bodyPr wrap="none" lIns="0" rIns="0" tIns="0" bIns="0"/>
+          <a:bodyPr lIns="0" rIns="0" tIns="0" bIns="0"/>
           <a:p>
             <a:endParaRPr/>
           </a:p>
@@ -604,7 +609,7 @@
       </p:grpSpPr>
       <p:sp>
         <p:nvSpPr>
-          <p:cNvPr id="9" name="PlaceHolder 1"/>
+          <p:cNvPr id="6" name="PlaceHolder 1"/>
           <p:cNvSpPr>
             <a:spLocks noGrp="1"/>
           </p:cNvSpPr>
@@ -615,22 +620,23 @@
         <p:spPr>
           <a:xfrm>
             <a:off x="685800" y="2130480"/>
-            <a:ext cx="7772040" cy="1469880"/>
-          </a:xfrm>
-          <a:prstGeom prst="rect">
-            <a:avLst/>
-          </a:prstGeom>
-        </p:spPr>
-        <p:txBody>
-          <a:bodyPr wrap="none" lIns="0" rIns="0" tIns="0" bIns="0" anchor="ctr"/>
-          <a:p>
-            <a:endParaRPr/>
-          </a:p>
-        </p:txBody>
-      </p:sp>
-      <p:sp>
-        <p:nvSpPr>
-          <p:cNvPr id="10" name="PlaceHolder 2"/>
+            <a:ext cx="7771680" cy="1469880"/>
+          </a:xfrm>
+          <a:prstGeom prst="rect">
+            <a:avLst/>
+          </a:prstGeom>
+        </p:spPr>
+        <p:txBody>
+          <a:bodyPr lIns="0" rIns="0" tIns="0" bIns="0" anchor="ctr"/>
+          <a:p>
+            <a:pPr algn="ctr"/>
+            <a:endParaRPr/>
+          </a:p>
+        </p:txBody>
+      </p:sp>
+      <p:sp>
+        <p:nvSpPr>
+          <p:cNvPr id="7" name="PlaceHolder 2"/>
           <p:cNvSpPr>
             <a:spLocks noGrp="1"/>
           </p:cNvSpPr>
@@ -648,15 +654,15 @@
           </a:prstGeom>
         </p:spPr>
         <p:txBody>
-          <a:bodyPr wrap="none" lIns="0" rIns="0" tIns="0" bIns="0"/>
-          <a:p>
-            <a:endParaRPr/>
-          </a:p>
-        </p:txBody>
-      </p:sp>
-      <p:sp>
-        <p:nvSpPr>
-          <p:cNvPr id="11" name="PlaceHolder 3"/>
+          <a:bodyPr lIns="0" rIns="0" tIns="0" bIns="0"/>
+          <a:p>
+            <a:endParaRPr/>
+          </a:p>
+        </p:txBody>
+      </p:sp>
+      <p:sp>
+        <p:nvSpPr>
+          <p:cNvPr id="8" name="PlaceHolder 3"/>
           <p:cNvSpPr>
             <a:spLocks noGrp="1"/>
           </p:cNvSpPr>
@@ -674,7 +680,7 @@
           </a:prstGeom>
         </p:spPr>
         <p:txBody>
-          <a:bodyPr wrap="none" lIns="0" rIns="0" tIns="0" bIns="0"/>
+          <a:bodyPr lIns="0" rIns="0" tIns="0" bIns="0"/>
           <a:p>
             <a:endParaRPr/>
           </a:p>
@@ -704,7 +710,7 @@
       </p:grpSpPr>
       <p:sp>
         <p:nvSpPr>
-          <p:cNvPr id="12" name="PlaceHolder 1"/>
+          <p:cNvPr id="9" name="PlaceHolder 1"/>
           <p:cNvSpPr>
             <a:spLocks noGrp="1"/>
           </p:cNvSpPr>
@@ -715,15 +721,16 @@
         <p:spPr>
           <a:xfrm>
             <a:off x="685800" y="2130480"/>
-            <a:ext cx="7772040" cy="1469880"/>
-          </a:xfrm>
-          <a:prstGeom prst="rect">
-            <a:avLst/>
-          </a:prstGeom>
-        </p:spPr>
-        <p:txBody>
-          <a:bodyPr wrap="none" lIns="0" rIns="0" tIns="0" bIns="0" anchor="ctr"/>
-          <a:p>
+            <a:ext cx="7771680" cy="1469880"/>
+          </a:xfrm>
+          <a:prstGeom prst="rect">
+            <a:avLst/>
+          </a:prstGeom>
+        </p:spPr>
+        <p:txBody>
+          <a:bodyPr lIns="0" rIns="0" tIns="0" bIns="0" anchor="ctr"/>
+          <a:p>
+            <a:pPr algn="ctr"/>
             <a:endParaRPr/>
           </a:p>
         </p:txBody>
@@ -752,7 +759,7 @@
       </p:grpSpPr>
       <p:sp>
         <p:nvSpPr>
-          <p:cNvPr id="13" name="PlaceHolder 1"/>
+          <p:cNvPr id="10" name="PlaceHolder 1"/>
           <p:cNvSpPr>
             <a:spLocks noGrp="1"/>
           </p:cNvSpPr>
@@ -763,14 +770,14 @@
         <p:spPr>
           <a:xfrm>
             <a:off x="685800" y="2130480"/>
-            <a:ext cx="7772040" cy="6813360"/>
-          </a:xfrm>
-          <a:prstGeom prst="rect">
-            <a:avLst/>
-          </a:prstGeom>
-        </p:spPr>
-        <p:txBody>
-          <a:bodyPr wrap="none" lIns="0" rIns="0" tIns="0" bIns="0" anchor="ctr"/>
+            <a:ext cx="7771680" cy="6813360"/>
+          </a:xfrm>
+          <a:prstGeom prst="rect">
+            <a:avLst/>
+          </a:prstGeom>
+        </p:spPr>
+        <p:txBody>
+          <a:bodyPr lIns="0" rIns="0" tIns="0" bIns="0" anchor="ctr"/>
           <a:p>
             <a:pPr algn="ctr"/>
             <a:endParaRPr/>
@@ -801,7 +808,7 @@
       </p:grpSpPr>
       <p:sp>
         <p:nvSpPr>
-          <p:cNvPr id="14" name="PlaceHolder 1"/>
+          <p:cNvPr id="11" name="PlaceHolder 1"/>
           <p:cNvSpPr>
             <a:spLocks noGrp="1"/>
           </p:cNvSpPr>
@@ -812,22 +819,23 @@
         <p:spPr>
           <a:xfrm>
             <a:off x="685800" y="2130480"/>
-            <a:ext cx="7772040" cy="1469880"/>
-          </a:xfrm>
-          <a:prstGeom prst="rect">
-            <a:avLst/>
-          </a:prstGeom>
-        </p:spPr>
-        <p:txBody>
-          <a:bodyPr wrap="none" lIns="0" rIns="0" tIns="0" bIns="0" anchor="ctr"/>
-          <a:p>
-            <a:endParaRPr/>
-          </a:p>
-        </p:txBody>
-      </p:sp>
-      <p:sp>
-        <p:nvSpPr>
-          <p:cNvPr id="15" name="PlaceHolder 2"/>
+            <a:ext cx="7771680" cy="1469880"/>
+          </a:xfrm>
+          <a:prstGeom prst="rect">
+            <a:avLst/>
+          </a:prstGeom>
+        </p:spPr>
+        <p:txBody>
+          <a:bodyPr lIns="0" rIns="0" tIns="0" bIns="0" anchor="ctr"/>
+          <a:p>
+            <a:pPr algn="ctr"/>
+            <a:endParaRPr/>
+          </a:p>
+        </p:txBody>
+      </p:sp>
+      <p:sp>
+        <p:nvSpPr>
+          <p:cNvPr id="12" name="PlaceHolder 2"/>
           <p:cNvSpPr>
             <a:spLocks noGrp="1"/>
           </p:cNvSpPr>
@@ -845,15 +853,15 @@
           </a:prstGeom>
         </p:spPr>
         <p:txBody>
-          <a:bodyPr wrap="none" lIns="0" rIns="0" tIns="0" bIns="0"/>
-          <a:p>
-            <a:endParaRPr/>
-          </a:p>
-        </p:txBody>
-      </p:sp>
-      <p:sp>
-        <p:nvSpPr>
-          <p:cNvPr id="16" name="PlaceHolder 3"/>
+          <a:bodyPr lIns="0" rIns="0" tIns="0" bIns="0"/>
+          <a:p>
+            <a:endParaRPr/>
+          </a:p>
+        </p:txBody>
+      </p:sp>
+      <p:sp>
+        <p:nvSpPr>
+          <p:cNvPr id="13" name="PlaceHolder 3"/>
           <p:cNvSpPr>
             <a:spLocks noGrp="1"/>
           </p:cNvSpPr>
@@ -871,15 +879,15 @@
           </a:prstGeom>
         </p:spPr>
         <p:txBody>
-          <a:bodyPr wrap="none" lIns="0" rIns="0" tIns="0" bIns="0"/>
-          <a:p>
-            <a:endParaRPr/>
-          </a:p>
-        </p:txBody>
-      </p:sp>
-      <p:sp>
-        <p:nvSpPr>
-          <p:cNvPr id="17" name="PlaceHolder 4"/>
+          <a:bodyPr lIns="0" rIns="0" tIns="0" bIns="0"/>
+          <a:p>
+            <a:endParaRPr/>
+          </a:p>
+        </p:txBody>
+      </p:sp>
+      <p:sp>
+        <p:nvSpPr>
+          <p:cNvPr id="14" name="PlaceHolder 4"/>
           <p:cNvSpPr>
             <a:spLocks noGrp="1"/>
           </p:cNvSpPr>
@@ -897,7 +905,7 @@
           </a:prstGeom>
         </p:spPr>
         <p:txBody>
-          <a:bodyPr wrap="none" lIns="0" rIns="0" tIns="0" bIns="0"/>
+          <a:bodyPr lIns="0" rIns="0" tIns="0" bIns="0"/>
           <a:p>
             <a:endParaRPr/>
           </a:p>
@@ -927,7 +935,7 @@
       </p:grpSpPr>
       <p:sp>
         <p:nvSpPr>
-          <p:cNvPr id="18" name="PlaceHolder 1"/>
+          <p:cNvPr id="15" name="PlaceHolder 1"/>
           <p:cNvSpPr>
             <a:spLocks noGrp="1"/>
           </p:cNvSpPr>
@@ -938,22 +946,23 @@
         <p:spPr>
           <a:xfrm>
             <a:off x="685800" y="2130480"/>
-            <a:ext cx="7772040" cy="1469880"/>
-          </a:xfrm>
-          <a:prstGeom prst="rect">
-            <a:avLst/>
-          </a:prstGeom>
-        </p:spPr>
-        <p:txBody>
-          <a:bodyPr wrap="none" lIns="0" rIns="0" tIns="0" bIns="0" anchor="ctr"/>
-          <a:p>
-            <a:endParaRPr/>
-          </a:p>
-        </p:txBody>
-      </p:sp>
-      <p:sp>
-        <p:nvSpPr>
-          <p:cNvPr id="19" name="PlaceHolder 2"/>
+            <a:ext cx="7771680" cy="1469880"/>
+          </a:xfrm>
+          <a:prstGeom prst="rect">
+            <a:avLst/>
+          </a:prstGeom>
+        </p:spPr>
+        <p:txBody>
+          <a:bodyPr lIns="0" rIns="0" tIns="0" bIns="0" anchor="ctr"/>
+          <a:p>
+            <a:pPr algn="ctr"/>
+            <a:endParaRPr/>
+          </a:p>
+        </p:txBody>
+      </p:sp>
+      <p:sp>
+        <p:nvSpPr>
+          <p:cNvPr id="16" name="PlaceHolder 2"/>
           <p:cNvSpPr>
             <a:spLocks noGrp="1"/>
           </p:cNvSpPr>
@@ -971,15 +980,15 @@
           </a:prstGeom>
         </p:spPr>
         <p:txBody>
-          <a:bodyPr wrap="none" lIns="0" rIns="0" tIns="0" bIns="0"/>
-          <a:p>
-            <a:endParaRPr/>
-          </a:p>
-        </p:txBody>
-      </p:sp>
-      <p:sp>
-        <p:nvSpPr>
-          <p:cNvPr id="20" name="PlaceHolder 3"/>
+          <a:bodyPr lIns="0" rIns="0" tIns="0" bIns="0"/>
+          <a:p>
+            <a:endParaRPr/>
+          </a:p>
+        </p:txBody>
+      </p:sp>
+      <p:sp>
+        <p:nvSpPr>
+          <p:cNvPr id="17" name="PlaceHolder 3"/>
           <p:cNvSpPr>
             <a:spLocks noGrp="1"/>
           </p:cNvSpPr>
@@ -997,15 +1006,15 @@
           </a:prstGeom>
         </p:spPr>
         <p:txBody>
-          <a:bodyPr wrap="none" lIns="0" rIns="0" tIns="0" bIns="0"/>
-          <a:p>
-            <a:endParaRPr/>
-          </a:p>
-        </p:txBody>
-      </p:sp>
-      <p:sp>
-        <p:nvSpPr>
-          <p:cNvPr id="21" name="PlaceHolder 4"/>
+          <a:bodyPr lIns="0" rIns="0" tIns="0" bIns="0"/>
+          <a:p>
+            <a:endParaRPr/>
+          </a:p>
+        </p:txBody>
+      </p:sp>
+      <p:sp>
+        <p:nvSpPr>
+          <p:cNvPr id="18" name="PlaceHolder 4"/>
           <p:cNvSpPr>
             <a:spLocks noGrp="1"/>
           </p:cNvSpPr>
@@ -1023,7 +1032,7 @@
           </a:prstGeom>
         </p:spPr>
         <p:txBody>
-          <a:bodyPr wrap="none" lIns="0" rIns="0" tIns="0" bIns="0"/>
+          <a:bodyPr lIns="0" rIns="0" tIns="0" bIns="0"/>
           <a:p>
             <a:endParaRPr/>
           </a:p>
@@ -1053,7 +1062,7 @@
       </p:grpSpPr>
       <p:sp>
         <p:nvSpPr>
-          <p:cNvPr id="22" name="PlaceHolder 1"/>
+          <p:cNvPr id="19" name="PlaceHolder 1"/>
           <p:cNvSpPr>
             <a:spLocks noGrp="1"/>
           </p:cNvSpPr>
@@ -1064,22 +1073,23 @@
         <p:spPr>
           <a:xfrm>
             <a:off x="685800" y="2130480"/>
-            <a:ext cx="7772040" cy="1469880"/>
-          </a:xfrm>
-          <a:prstGeom prst="rect">
-            <a:avLst/>
-          </a:prstGeom>
-        </p:spPr>
-        <p:txBody>
-          <a:bodyPr wrap="none" lIns="0" rIns="0" tIns="0" bIns="0" anchor="ctr"/>
-          <a:p>
-            <a:endParaRPr/>
-          </a:p>
-        </p:txBody>
-      </p:sp>
-      <p:sp>
-        <p:nvSpPr>
-          <p:cNvPr id="23" name="PlaceHolder 2"/>
+            <a:ext cx="7771680" cy="1469880"/>
+          </a:xfrm>
+          <a:prstGeom prst="rect">
+            <a:avLst/>
+          </a:prstGeom>
+        </p:spPr>
+        <p:txBody>
+          <a:bodyPr lIns="0" rIns="0" tIns="0" bIns="0" anchor="ctr"/>
+          <a:p>
+            <a:pPr algn="ctr"/>
+            <a:endParaRPr/>
+          </a:p>
+        </p:txBody>
+      </p:sp>
+      <p:sp>
+        <p:nvSpPr>
+          <p:cNvPr id="20" name="PlaceHolder 2"/>
           <p:cNvSpPr>
             <a:spLocks noGrp="1"/>
           </p:cNvSpPr>
@@ -1097,15 +1107,15 @@
           </a:prstGeom>
         </p:spPr>
         <p:txBody>
-          <a:bodyPr wrap="none" lIns="0" rIns="0" tIns="0" bIns="0"/>
-          <a:p>
-            <a:endParaRPr/>
-          </a:p>
-        </p:txBody>
-      </p:sp>
-      <p:sp>
-        <p:nvSpPr>
-          <p:cNvPr id="24" name="PlaceHolder 3"/>
+          <a:bodyPr lIns="0" rIns="0" tIns="0" bIns="0"/>
+          <a:p>
+            <a:endParaRPr/>
+          </a:p>
+        </p:txBody>
+      </p:sp>
+      <p:sp>
+        <p:nvSpPr>
+          <p:cNvPr id="21" name="PlaceHolder 3"/>
           <p:cNvSpPr>
             <a:spLocks noGrp="1"/>
           </p:cNvSpPr>
@@ -1123,15 +1133,15 @@
           </a:prstGeom>
         </p:spPr>
         <p:txBody>
-          <a:bodyPr wrap="none" lIns="0" rIns="0" tIns="0" bIns="0"/>
-          <a:p>
-            <a:endParaRPr/>
-          </a:p>
-        </p:txBody>
-      </p:sp>
-      <p:sp>
-        <p:nvSpPr>
-          <p:cNvPr id="25" name="PlaceHolder 4"/>
+          <a:bodyPr lIns="0" rIns="0" tIns="0" bIns="0"/>
+          <a:p>
+            <a:endParaRPr/>
+          </a:p>
+        </p:txBody>
+      </p:sp>
+      <p:sp>
+        <p:nvSpPr>
+          <p:cNvPr id="22" name="PlaceHolder 4"/>
           <p:cNvSpPr>
             <a:spLocks noGrp="1"/>
           </p:cNvSpPr>
@@ -1149,7 +1159,7 @@
           </a:prstGeom>
         </p:spPr>
         <p:txBody>
-          <a:bodyPr wrap="none" lIns="0" rIns="0" tIns="0" bIns="0"/>
+          <a:bodyPr lIns="0" rIns="0" tIns="0" bIns="0"/>
           <a:p>
             <a:endParaRPr/>
           </a:p>
@@ -1197,28 +1207,20 @@
         <p:spPr>
           <a:xfrm>
             <a:off x="685800" y="2130480"/>
-            <a:ext cx="7772040" cy="1469520"/>
-          </a:xfrm>
-          <a:prstGeom prst="rect">
-            <a:avLst/>
-          </a:prstGeom>
-        </p:spPr>
-        <p:txBody>
-          <a:bodyPr lIns="90000" rIns="90000" tIns="45000" bIns="45000"/>
-          <a:p>
-            <a:pPr algn="ctr">
-              <a:lnSpc>
-                <a:spcPct val="100000"/>
-              </a:lnSpc>
-            </a:pPr>
+            <a:ext cx="7771680" cy="1469520"/>
+          </a:xfrm>
+          <a:prstGeom prst="rect">
+            <a:avLst/>
+          </a:prstGeom>
+        </p:spPr>
+        <p:txBody>
+          <a:bodyPr lIns="0" rIns="0" tIns="0" bIns="0" anchor="ctr"/>
+          <a:p>
             <a:r>
-              <a:rPr lang="pt-BR" sz="4400">
-                <a:solidFill>
-                  <a:srgbClr val="000000"/>
-                </a:solidFill>
-                <a:latin typeface="Calibri"/>
+              <a:rPr lang="pt-BR">
+                <a:latin typeface="Arial"/>
               </a:rPr>
-              <a:t>Click to edit the title text formatClique para editar o estilo do título mestre</a:t>
+              <a:t>Click to edit the title text format</a:t>
             </a:r>
             <a:endParaRPr/>
           </a:p>
@@ -1227,112 +1229,6 @@
       <p:sp>
         <p:nvSpPr>
           <p:cNvPr id="1" name="PlaceHolder 2"/>
-          <p:cNvSpPr>
-            <a:spLocks noGrp="1"/>
-          </p:cNvSpPr>
-          <p:nvPr>
-            <p:ph type="dt"/>
-          </p:nvPr>
-        </p:nvSpPr>
-        <p:spPr>
-          <a:xfrm>
-            <a:off x="457200" y="6356520"/>
-            <a:ext cx="2133360" cy="364680"/>
-          </a:xfrm>
-          <a:prstGeom prst="rect">
-            <a:avLst/>
-          </a:prstGeom>
-        </p:spPr>
-        <p:txBody>
-          <a:bodyPr anchor="ctr"/>
-          <a:p>
-            <a:pPr>
-              <a:lnSpc>
-                <a:spcPct val="100000"/>
-              </a:lnSpc>
-            </a:pPr>
-            <a:r>
-              <a:rPr lang="pt-BR" sz="1200">
-                <a:solidFill>
-                  <a:srgbClr val="8b8b8b"/>
-                </a:solidFill>
-                <a:latin typeface="Calibri"/>
-              </a:rPr>
-              <a:t>16/09/14</a:t>
-            </a:r>
-            <a:endParaRPr/>
-          </a:p>
-        </p:txBody>
-      </p:sp>
-      <p:sp>
-        <p:nvSpPr>
-          <p:cNvPr id="2" name="PlaceHolder 3"/>
-          <p:cNvSpPr>
-            <a:spLocks noGrp="1"/>
-          </p:cNvSpPr>
-          <p:nvPr>
-            <p:ph type="ftr"/>
-          </p:nvPr>
-        </p:nvSpPr>
-        <p:spPr>
-          <a:xfrm>
-            <a:off x="3124080" y="6356520"/>
-            <a:ext cx="2895120" cy="364680"/>
-          </a:xfrm>
-          <a:prstGeom prst="rect">
-            <a:avLst/>
-          </a:prstGeom>
-        </p:spPr>
-        <p:txBody>
-          <a:bodyPr anchor="ctr"/>
-          <a:p>
-            <a:endParaRPr/>
-          </a:p>
-        </p:txBody>
-      </p:sp>
-      <p:sp>
-        <p:nvSpPr>
-          <p:cNvPr id="3" name="PlaceHolder 4"/>
-          <p:cNvSpPr>
-            <a:spLocks noGrp="1"/>
-          </p:cNvSpPr>
-          <p:nvPr>
-            <p:ph type="sldNum"/>
-          </p:nvPr>
-        </p:nvSpPr>
-        <p:spPr>
-          <a:xfrm>
-            <a:off x="6553080" y="6356520"/>
-            <a:ext cx="2133360" cy="364680"/>
-          </a:xfrm>
-          <a:prstGeom prst="rect">
-            <a:avLst/>
-          </a:prstGeom>
-        </p:spPr>
-        <p:txBody>
-          <a:bodyPr anchor="ctr"/>
-          <a:p>
-            <a:pPr algn="r">
-              <a:lnSpc>
-                <a:spcPct val="100000"/>
-              </a:lnSpc>
-            </a:pPr>
-            <a:fld id="{C663C9CB-BE17-46D0-8B7D-3F285E7D1B16}" type="slidenum">
-              <a:rPr lang="pt-BR" sz="1200">
-                <a:solidFill>
-                  <a:srgbClr val="8b8b8b"/>
-                </a:solidFill>
-                <a:latin typeface="Calibri"/>
-              </a:rPr>
-              <a:t>&lt;number&gt;</a:t>
-            </a:fld>
-            <a:endParaRPr/>
-          </a:p>
-        </p:txBody>
-      </p:sp>
-      <p:sp>
-        <p:nvSpPr>
-          <p:cNvPr id="4" name="PlaceHolder 5"/>
           <p:cNvSpPr>
             <a:spLocks noGrp="1"/>
           </p:cNvSpPr>
@@ -1350,87 +1246,101 @@
           </a:prstGeom>
         </p:spPr>
         <p:txBody>
-          <a:bodyPr wrap="none" lIns="0" rIns="0" tIns="0" bIns="0"/>
+          <a:bodyPr lIns="0" rIns="0" tIns="0" bIns="0"/>
           <a:p>
             <a:pPr>
-              <a:buSzPct val="25000"/>
+              <a:buSzPct val="45000"/>
               <a:buFont typeface="StarSymbol"/>
               <a:buChar char=""/>
             </a:pPr>
             <a:r>
-              <a:rPr lang="pt-BR"/>
+              <a:rPr lang="pt-BR" sz="3200">
+                <a:latin typeface="Arial"/>
+              </a:rPr>
               <a:t>Click to edit the outline text format</a:t>
             </a:r>
             <a:endParaRPr/>
           </a:p>
           <a:p>
             <a:pPr lvl="1">
-              <a:buSzPct val="25000"/>
+              <a:buSzPct val="75000"/>
               <a:buFont typeface="StarSymbol"/>
               <a:buChar char=""/>
             </a:pPr>
             <a:r>
-              <a:rPr lang="pt-BR"/>
+              <a:rPr lang="pt-BR" sz="2800">
+                <a:latin typeface="Arial"/>
+              </a:rPr>
               <a:t>Second Outline Level</a:t>
             </a:r>
             <a:endParaRPr/>
           </a:p>
           <a:p>
             <a:pPr lvl="2">
-              <a:buSzPct val="25000"/>
+              <a:buSzPct val="45000"/>
               <a:buFont typeface="StarSymbol"/>
               <a:buChar char=""/>
             </a:pPr>
             <a:r>
-              <a:rPr lang="pt-BR"/>
+              <a:rPr lang="pt-BR" sz="2400">
+                <a:latin typeface="Arial"/>
+              </a:rPr>
               <a:t>Third Outline Level</a:t>
             </a:r>
             <a:endParaRPr/>
           </a:p>
           <a:p>
             <a:pPr lvl="3">
-              <a:buSzPct val="25000"/>
+              <a:buSzPct val="75000"/>
               <a:buFont typeface="StarSymbol"/>
               <a:buChar char=""/>
             </a:pPr>
             <a:r>
-              <a:rPr lang="pt-BR"/>
+              <a:rPr lang="pt-BR" sz="2000">
+                <a:latin typeface="Arial"/>
+              </a:rPr>
               <a:t>Fourth Outline Level</a:t>
             </a:r>
             <a:endParaRPr/>
           </a:p>
           <a:p>
             <a:pPr lvl="4">
-              <a:buSzPct val="25000"/>
+              <a:buSzPct val="45000"/>
               <a:buFont typeface="StarSymbol"/>
               <a:buChar char=""/>
             </a:pPr>
             <a:r>
-              <a:rPr lang="pt-BR"/>
+              <a:rPr lang="pt-BR" sz="2000">
+                <a:latin typeface="Arial"/>
+              </a:rPr>
               <a:t>Fifth Outline Level</a:t>
             </a:r>
             <a:endParaRPr/>
           </a:p>
           <a:p>
             <a:pPr lvl="5">
-              <a:buSzPct val="25000"/>
+              <a:buSzPct val="45000"/>
               <a:buFont typeface="StarSymbol"/>
               <a:buChar char=""/>
             </a:pPr>
             <a:r>
-              <a:rPr lang="pt-BR"/>
+              <a:rPr lang="pt-BR" sz="2000">
+                <a:latin typeface="Arial"/>
+              </a:rPr>
               <a:t>Sixth Outline Level</a:t>
             </a:r>
             <a:endParaRPr/>
           </a:p>
           <a:p>
             <a:pPr lvl="6">
-              <a:buSzPct val="25000"/>
+              <a:buSzPct val="45000"/>
               <a:buFont typeface="StarSymbol"/>
               <a:buChar char=""/>
             </a:pPr>
             <a:r>
-              <a:rPr lang="pt-BR"/>
+              <a:rPr lang="pt-BR" sz="2000">
+                <a:latin typeface="Arial"/>
+              </a:rPr>
               <a:t>Seventh Outline Level</a:t>
             </a:r>
             <a:endParaRPr/>
@@ -1476,7 +1386,7 @@
       </p:grpSpPr>
       <p:pic>
         <p:nvPicPr>
-          <p:cNvPr id="39" name="Picture 2" descr=""/>
+          <p:cNvPr id="36" name="Picture 2" descr=""/>
           <p:cNvPicPr/>
           <p:nvPr/>
         </p:nvPicPr>
@@ -1488,8 +1398,8 @@
         </p:blipFill>
         <p:spPr>
           <a:xfrm>
-            <a:off x="0" y="-27360"/>
-            <a:ext cx="9143640" cy="6885000"/>
+            <a:off x="720" y="-27360"/>
+            <a:ext cx="9143280" cy="6884640"/>
           </a:xfrm>
           <a:prstGeom prst="rect">
             <a:avLst/>
@@ -1501,7 +1411,7 @@
       </p:pic>
       <p:pic>
         <p:nvPicPr>
-          <p:cNvPr id="40" name="Imagem 8" descr=""/>
+          <p:cNvPr id="37" name="Imagem 8" descr=""/>
           <p:cNvPicPr/>
           <p:nvPr/>
         </p:nvPicPr>
@@ -1514,7 +1424,7 @@
         <p:spPr>
           <a:xfrm>
             <a:off x="2533680" y="5445360"/>
-            <a:ext cx="900360" cy="1047960"/>
+            <a:ext cx="900000" cy="1047600"/>
           </a:xfrm>
           <a:prstGeom prst="rect">
             <a:avLst/>
@@ -1526,7 +1436,7 @@
       </p:pic>
       <p:pic>
         <p:nvPicPr>
-          <p:cNvPr id="41" name="Imagem 2" descr=""/>
+          <p:cNvPr id="38" name="Imagem 2" descr=""/>
           <p:cNvPicPr/>
           <p:nvPr/>
         </p:nvPicPr>
@@ -1539,7 +1449,7 @@
         <p:spPr>
           <a:xfrm>
             <a:off x="683640" y="5445360"/>
-            <a:ext cx="1439640" cy="1151640"/>
+            <a:ext cx="1439280" cy="1151280"/>
           </a:xfrm>
           <a:prstGeom prst="rect">
             <a:avLst/>
@@ -1551,14 +1461,14 @@
       </p:pic>
       <p:sp>
         <p:nvSpPr>
-          <p:cNvPr id="42" name="CustomShape 1"/>
+          <p:cNvPr id="39" name="CustomShape 1"/>
           <p:cNvSpPr/>
           <p:nvPr/>
         </p:nvSpPr>
         <p:spPr>
           <a:xfrm>
             <a:off x="539640" y="5148000"/>
-            <a:ext cx="1850040" cy="912600"/>
+            <a:ext cx="1849680" cy="912240"/>
           </a:xfrm>
           <a:prstGeom prst="rect">
             <a:avLst/>
@@ -1591,14 +1501,14 @@
       </p:sp>
       <p:sp>
         <p:nvSpPr>
-          <p:cNvPr id="43" name="CustomShape 2"/>
+          <p:cNvPr id="40" name="CustomShape 2"/>
           <p:cNvSpPr/>
           <p:nvPr/>
         </p:nvSpPr>
         <p:spPr>
           <a:xfrm>
             <a:off x="2411640" y="5148000"/>
-            <a:ext cx="1620360" cy="638280"/>
+            <a:ext cx="1620000" cy="637920"/>
           </a:xfrm>
           <a:prstGeom prst="rect">
             <a:avLst/>
@@ -1631,7 +1541,7 @@
       </p:sp>
       <p:pic>
         <p:nvPicPr>
-          <p:cNvPr id="44" name="Picture 2" descr=""/>
+          <p:cNvPr id="41" name="Picture 2" descr=""/>
           <p:cNvPicPr/>
           <p:nvPr/>
         </p:nvPicPr>
@@ -1644,7 +1554,7 @@
         <p:spPr>
           <a:xfrm>
             <a:off x="722520" y="254880"/>
-            <a:ext cx="7669080" cy="1386720"/>
+            <a:ext cx="7668720" cy="1386360"/>
           </a:xfrm>
           <a:prstGeom prst="rect">
             <a:avLst/>
@@ -1656,7 +1566,7 @@
       </p:pic>
       <p:sp>
         <p:nvSpPr>
-          <p:cNvPr id="45" name="Line 3"/>
+          <p:cNvPr id="42" name="Line 3"/>
           <p:cNvSpPr/>
           <p:nvPr/>
         </p:nvSpPr>
@@ -1678,14 +1588,14 @@
       </p:sp>
       <p:sp>
         <p:nvSpPr>
-          <p:cNvPr id="46" name="CustomShape 4"/>
+          <p:cNvPr id="43" name="CustomShape 4"/>
           <p:cNvSpPr/>
           <p:nvPr/>
         </p:nvSpPr>
         <p:spPr>
           <a:xfrm>
             <a:off x="683640" y="1628640"/>
-            <a:ext cx="7671960" cy="760680"/>
+            <a:ext cx="7671600" cy="760320"/>
           </a:xfrm>
           <a:prstGeom prst="rect">
             <a:avLst/>
@@ -1718,14 +1628,14 @@
       </p:sp>
       <p:sp>
         <p:nvSpPr>
-          <p:cNvPr id="47" name="CustomShape 5"/>
+          <p:cNvPr id="44" name="CustomShape 5"/>
           <p:cNvSpPr/>
           <p:nvPr/>
         </p:nvSpPr>
         <p:spPr>
           <a:xfrm>
             <a:off x="5148000" y="6093360"/>
-            <a:ext cx="2736000" cy="395280"/>
+            <a:ext cx="2735640" cy="394920"/>
           </a:xfrm>
           <a:prstGeom prst="rect">
             <a:avLst/>
@@ -1758,63 +1668,39 @@
       </p:sp>
       <p:sp>
         <p:nvSpPr>
-          <p:cNvPr id="48" name="CustomShape 6"/>
+          <p:cNvPr id="45" name="CustomShape 6"/>
           <p:cNvSpPr/>
           <p:nvPr/>
         </p:nvSpPr>
         <p:spPr>
           <a:xfrm>
-            <a:off x="611640" y="2349000"/>
-            <a:ext cx="7848360" cy="639000"/>
-          </a:xfrm>
-          <a:prstGeom prst="rect">
-            <a:avLst/>
-          </a:prstGeom>
-          <a:noFill/>
-          <a:ln>
-            <a:noFill/>
+            <a:off x="0" y="2880000"/>
+            <a:ext cx="9144000" cy="432000"/>
+          </a:xfrm>
+          <a:prstGeom prst="rect">
+            <a:avLst/>
+          </a:prstGeom>
+          <a:solidFill>
+            <a:srgbClr val="000000"/>
+          </a:solidFill>
+          <a:ln w="6480">
+            <a:solidFill>
+              <a:srgbClr val="000000"/>
+            </a:solidFill>
+            <a:round/>
           </a:ln>
         </p:spPr>
-        <p:txBody>
-          <a:bodyPr lIns="90000" rIns="90000" tIns="45000" bIns="45000"/>
-          <a:p>
-            <a:pPr algn="just">
-              <a:lnSpc>
-                <a:spcPct val="100000"/>
-              </a:lnSpc>
-            </a:pPr>
-            <a:r>
-              <a:rPr lang="pt-BR">
-                <a:solidFill>
-                  <a:srgbClr val="000000"/>
-                </a:solidFill>
-                <a:latin typeface="Garamond"/>
-              </a:rPr>
-              <a:t>O Programa </a:t>
-            </a:r>
-            <a:r>
-              <a:rPr lang="pt-BR">
-                <a:solidFill>
-                  <a:srgbClr val="000000"/>
-                </a:solidFill>
-                <a:latin typeface="Garamond"/>
-              </a:rPr>
-              <a:t>de Educação Tutorial – PET certifica que, entre os  dias 07 e 09 de maio de 2014,</a:t>
-            </a:r>
-            <a:endParaRPr/>
-          </a:p>
-        </p:txBody>
-      </p:sp>
-      <p:sp>
-        <p:nvSpPr>
-          <p:cNvPr id="49" name="CustomShape 7"/>
+      </p:sp>
+      <p:sp>
+        <p:nvSpPr>
+          <p:cNvPr id="46" name="CustomShape 7"/>
           <p:cNvSpPr/>
           <p:nvPr/>
         </p:nvSpPr>
         <p:spPr>
           <a:xfrm>
             <a:off x="618480" y="3246480"/>
-            <a:ext cx="7776360" cy="913320"/>
+            <a:ext cx="7776000" cy="912960"/>
           </a:xfrm>
           <a:prstGeom prst="rect">
             <a:avLst/>
@@ -1873,14 +1759,14 @@
       </p:sp>
       <p:sp>
         <p:nvSpPr>
-          <p:cNvPr id="50" name="CustomShape 8"/>
+          <p:cNvPr id="47" name="CustomShape 8"/>
           <p:cNvSpPr/>
           <p:nvPr/>
         </p:nvSpPr>
         <p:spPr>
           <a:xfrm>
             <a:off x="611640" y="4211640"/>
-            <a:ext cx="7776360" cy="639000"/>
+            <a:ext cx="7776000" cy="638640"/>
           </a:xfrm>
           <a:prstGeom prst="rect">
             <a:avLst/>
@@ -1918,6 +1804,96 @@
             <a:endParaRPr/>
           </a:p>
         </p:txBody>
+      </p:sp>
+      <p:sp>
+        <p:nvSpPr>
+          <p:cNvPr id="48" name="CustomShape 9"/>
+          <p:cNvSpPr/>
+          <p:nvPr/>
+        </p:nvSpPr>
+        <p:spPr>
+          <a:xfrm>
+            <a:off x="432000" y="2367360"/>
+            <a:ext cx="7848000" cy="638640"/>
+          </a:xfrm>
+          <a:prstGeom prst="rect">
+            <a:avLst/>
+          </a:prstGeom>
+          <a:noFill/>
+          <a:ln>
+            <a:noFill/>
+          </a:ln>
+        </p:spPr>
+        <p:txBody>
+          <a:bodyPr lIns="90000" rIns="90000" tIns="45000" bIns="45000"/>
+          <a:p>
+            <a:pPr algn="just">
+              <a:lnSpc>
+                <a:spcPct val="100000"/>
+              </a:lnSpc>
+            </a:pPr>
+            <a:r>
+              <a:rPr lang="pt-BR">
+                <a:solidFill>
+                  <a:srgbClr val="000000"/>
+                </a:solidFill>
+                <a:latin typeface="Garamond"/>
+              </a:rPr>
+              <a:t>O Programa de Educação Tutorial – PET certifica que, entre os  dias 07 e 09 de maio de 2014,</a:t>
+            </a:r>
+            <a:endParaRPr/>
+          </a:p>
+        </p:txBody>
+      </p:sp>
+      <p:sp>
+        <p:nvSpPr>
+          <p:cNvPr id="49" name="CustomShape 10"/>
+          <p:cNvSpPr/>
+          <p:nvPr/>
+        </p:nvSpPr>
+        <p:spPr>
+          <a:xfrm>
+            <a:off x="0" y="3816000"/>
+            <a:ext cx="9144000" cy="432000"/>
+          </a:xfrm>
+          <a:prstGeom prst="rect">
+            <a:avLst/>
+          </a:prstGeom>
+          <a:solidFill>
+            <a:srgbClr val="000000"/>
+          </a:solidFill>
+          <a:ln w="6480">
+            <a:solidFill>
+              <a:srgbClr val="000000"/>
+            </a:solidFill>
+            <a:round/>
+          </a:ln>
+        </p:spPr>
+      </p:sp>
+      <p:sp>
+        <p:nvSpPr>
+          <p:cNvPr id="50" name="CustomShape 11"/>
+          <p:cNvSpPr/>
+          <p:nvPr/>
+        </p:nvSpPr>
+        <p:spPr>
+          <a:xfrm>
+            <a:off x="-720" y="4536000"/>
+            <a:ext cx="4608720" cy="612000"/>
+          </a:xfrm>
+          <a:prstGeom prst="rect">
+            <a:avLst/>
+          </a:prstGeom>
+          <a:solidFill>
+            <a:srgbClr val="000000"/>
+          </a:solidFill>
+          <a:ln w="6480">
+            <a:solidFill>
+              <a:srgbClr val="000000"/>
+            </a:solidFill>
+            <a:round/>
+          </a:ln>
+        </p:spPr>
       </p:sp>
     </p:spTree>
   </p:cSld>

</xml_diff>

<commit_message>
Feita a parte de geração do código hash para validação do certificado
</commit_message>
<xml_diff>
--- a/sistema-seven/web/resources/template.pptx
+++ b/sistema-seven/web/resources/template.pptx
@@ -63,8 +63,8 @@
         </p:nvSpPr>
         <p:spPr>
           <a:xfrm>
-            <a:off x="685800" y="2130480"/>
-            <a:ext cx="7771680" cy="1469880"/>
+            <a:off x="457200" y="273600"/>
+            <a:ext cx="8229240" cy="1145160"/>
           </a:xfrm>
           <a:prstGeom prst="rect">
             <a:avLst/>
@@ -164,8 +164,8 @@
         </p:nvSpPr>
         <p:spPr>
           <a:xfrm>
-            <a:off x="685800" y="2130480"/>
-            <a:ext cx="7771680" cy="1469880"/>
+            <a:off x="457200" y="273600"/>
+            <a:ext cx="8229240" cy="1145160"/>
           </a:xfrm>
           <a:prstGeom prst="rect">
             <a:avLst/>
@@ -317,8 +317,8 @@
         </p:nvSpPr>
         <p:spPr>
           <a:xfrm>
-            <a:off x="685800" y="2130480"/>
-            <a:ext cx="7771680" cy="1469880"/>
+            <a:off x="457200" y="273600"/>
+            <a:ext cx="8229240" cy="1145160"/>
           </a:xfrm>
           <a:prstGeom prst="rect">
             <a:avLst/>
@@ -468,8 +468,8 @@
         </p:nvSpPr>
         <p:spPr>
           <a:xfrm>
-            <a:off x="685800" y="2130480"/>
-            <a:ext cx="7771680" cy="1469880"/>
+            <a:off x="457200" y="273600"/>
+            <a:ext cx="8229240" cy="1145160"/>
           </a:xfrm>
           <a:prstGeom prst="rect">
             <a:avLst/>
@@ -544,8 +544,8 @@
         </p:nvSpPr>
         <p:spPr>
           <a:xfrm>
-            <a:off x="685800" y="2130480"/>
-            <a:ext cx="7771680" cy="1469880"/>
+            <a:off x="457200" y="273600"/>
+            <a:ext cx="8229240" cy="1145160"/>
           </a:xfrm>
           <a:prstGeom prst="rect">
             <a:avLst/>
@@ -619,8 +619,8 @@
         </p:nvSpPr>
         <p:spPr>
           <a:xfrm>
-            <a:off x="685800" y="2130480"/>
-            <a:ext cx="7771680" cy="1469880"/>
+            <a:off x="457200" y="273600"/>
+            <a:ext cx="8229240" cy="1145160"/>
           </a:xfrm>
           <a:prstGeom prst="rect">
             <a:avLst/>
@@ -720,8 +720,8 @@
         </p:nvSpPr>
         <p:spPr>
           <a:xfrm>
-            <a:off x="685800" y="2130480"/>
-            <a:ext cx="7771680" cy="1469880"/>
+            <a:off x="457200" y="273600"/>
+            <a:ext cx="8229240" cy="1145160"/>
           </a:xfrm>
           <a:prstGeom prst="rect">
             <a:avLst/>
@@ -769,8 +769,8 @@
         </p:nvSpPr>
         <p:spPr>
           <a:xfrm>
-            <a:off x="685800" y="2130480"/>
-            <a:ext cx="7771680" cy="6813360"/>
+            <a:off x="457200" y="273600"/>
+            <a:ext cx="8229240" cy="5308200"/>
           </a:xfrm>
           <a:prstGeom prst="rect">
             <a:avLst/>
@@ -818,8 +818,8 @@
         </p:nvSpPr>
         <p:spPr>
           <a:xfrm>
-            <a:off x="685800" y="2130480"/>
-            <a:ext cx="7771680" cy="1469880"/>
+            <a:off x="457200" y="273600"/>
+            <a:ext cx="8229240" cy="1145160"/>
           </a:xfrm>
           <a:prstGeom prst="rect">
             <a:avLst/>
@@ -945,8 +945,8 @@
         </p:nvSpPr>
         <p:spPr>
           <a:xfrm>
-            <a:off x="685800" y="2130480"/>
-            <a:ext cx="7771680" cy="1469880"/>
+            <a:off x="457200" y="273600"/>
+            <a:ext cx="8229240" cy="1145160"/>
           </a:xfrm>
           <a:prstGeom prst="rect">
             <a:avLst/>
@@ -1072,8 +1072,8 @@
         </p:nvSpPr>
         <p:spPr>
           <a:xfrm>
-            <a:off x="685800" y="2130480"/>
-            <a:ext cx="7771680" cy="1469880"/>
+            <a:off x="457200" y="273600"/>
+            <a:ext cx="8229240" cy="1145160"/>
           </a:xfrm>
           <a:prstGeom prst="rect">
             <a:avLst/>
@@ -1206,8 +1206,8 @@
         </p:nvSpPr>
         <p:spPr>
           <a:xfrm>
-            <a:off x="685800" y="2130480"/>
-            <a:ext cx="7771680" cy="1469520"/>
+            <a:off x="457200" y="273600"/>
+            <a:ext cx="8229240" cy="1144800"/>
           </a:xfrm>
           <a:prstGeom prst="rect">
             <a:avLst/>
@@ -1216,11 +1216,12 @@
         <p:txBody>
           <a:bodyPr lIns="0" rIns="0" tIns="0" bIns="0" anchor="ctr"/>
           <a:p>
+            <a:pPr algn="ctr"/>
             <a:r>
-              <a:rPr lang="pt-BR">
+              <a:rPr lang="pt-BR" sz="4400">
                 <a:latin typeface="Arial"/>
               </a:rPr>
-              <a:t>Click to edit the title text format</a:t>
+              <a:t>Clique para editar o formato do texto do título</a:t>
             </a:r>
             <a:endParaRPr/>
           </a:p>
@@ -1257,7 +1258,7 @@
               <a:rPr lang="pt-BR" sz="3200">
                 <a:latin typeface="Arial"/>
               </a:rPr>
-              <a:t>Click to edit the outline text format</a:t>
+              <a:t>Clique para editar o formato do texto da estrutura de tópicos</a:t>
             </a:r>
             <a:endParaRPr/>
           </a:p>
@@ -1271,7 +1272,7 @@
               <a:rPr lang="pt-BR" sz="2800">
                 <a:latin typeface="Arial"/>
               </a:rPr>
-              <a:t>Second Outline Level</a:t>
+              <a:t>2.º Nível da estrutura de tópicos</a:t>
             </a:r>
             <a:endParaRPr/>
           </a:p>
@@ -1285,7 +1286,7 @@
               <a:rPr lang="pt-BR" sz="2400">
                 <a:latin typeface="Arial"/>
               </a:rPr>
-              <a:t>Third Outline Level</a:t>
+              <a:t>3.º Nível da estrutura de tópicos</a:t>
             </a:r>
             <a:endParaRPr/>
           </a:p>
@@ -1299,7 +1300,7 @@
               <a:rPr lang="pt-BR" sz="2000">
                 <a:latin typeface="Arial"/>
               </a:rPr>
-              <a:t>Fourth Outline Level</a:t>
+              <a:t>4.º Nível da estrutura de tópicos</a:t>
             </a:r>
             <a:endParaRPr/>
           </a:p>
@@ -1313,7 +1314,7 @@
               <a:rPr lang="pt-BR" sz="2000">
                 <a:latin typeface="Arial"/>
               </a:rPr>
-              <a:t>Fifth Outline Level</a:t>
+              <a:t>5.º Nível da estrutura de tópicos</a:t>
             </a:r>
             <a:endParaRPr/>
           </a:p>
@@ -1327,7 +1328,7 @@
               <a:rPr lang="pt-BR" sz="2000">
                 <a:latin typeface="Arial"/>
               </a:rPr>
-              <a:t>Sixth Outline Level</a:t>
+              <a:t>6.º Nível da estrutura de tópicos</a:t>
             </a:r>
             <a:endParaRPr/>
           </a:p>
@@ -1341,7 +1342,7 @@
               <a:rPr lang="pt-BR" sz="2000">
                 <a:latin typeface="Arial"/>
               </a:rPr>
-              <a:t>Seventh Outline Level</a:t>
+              <a:t>7.º Nível da estrutura de tópicos</a:t>
             </a:r>
             <a:endParaRPr/>
           </a:p>
@@ -1399,7 +1400,7 @@
         <p:spPr>
           <a:xfrm>
             <a:off x="720" y="-27360"/>
-            <a:ext cx="9143280" cy="6884640"/>
+            <a:ext cx="9142560" cy="6883920"/>
           </a:xfrm>
           <a:prstGeom prst="rect">
             <a:avLst/>
@@ -1424,7 +1425,7 @@
         <p:spPr>
           <a:xfrm>
             <a:off x="2533680" y="5445360"/>
-            <a:ext cx="900000" cy="1047600"/>
+            <a:ext cx="899280" cy="746640"/>
           </a:xfrm>
           <a:prstGeom prst="rect">
             <a:avLst/>
@@ -1449,7 +1450,7 @@
         <p:spPr>
           <a:xfrm>
             <a:off x="683640" y="5445360"/>
-            <a:ext cx="1439280" cy="1151280"/>
+            <a:ext cx="1438560" cy="818640"/>
           </a:xfrm>
           <a:prstGeom prst="rect">
             <a:avLst/>
@@ -1468,7 +1469,7 @@
         <p:spPr>
           <a:xfrm>
             <a:off x="539640" y="5148000"/>
-            <a:ext cx="1849680" cy="912240"/>
+            <a:ext cx="1848960" cy="911520"/>
           </a:xfrm>
           <a:prstGeom prst="rect">
             <a:avLst/>
@@ -1508,7 +1509,7 @@
         <p:spPr>
           <a:xfrm>
             <a:off x="2411640" y="5148000"/>
-            <a:ext cx="1620000" cy="637920"/>
+            <a:ext cx="1619280" cy="637200"/>
           </a:xfrm>
           <a:prstGeom prst="rect">
             <a:avLst/>
@@ -1554,7 +1555,7 @@
         <p:spPr>
           <a:xfrm>
             <a:off x="722520" y="254880"/>
-            <a:ext cx="7668720" cy="1386360"/>
+            <a:ext cx="7668000" cy="1385640"/>
           </a:xfrm>
           <a:prstGeom prst="rect">
             <a:avLst/>
@@ -1572,7 +1573,7 @@
         </p:nvSpPr>
         <p:spPr>
           <a:xfrm>
-            <a:off x="4572000" y="6021000"/>
+            <a:off x="4679640" y="5688000"/>
             <a:ext cx="3240360" cy="0"/>
           </a:xfrm>
           <a:prstGeom prst="line">
@@ -1595,7 +1596,7 @@
         <p:spPr>
           <a:xfrm>
             <a:off x="683640" y="1628640"/>
-            <a:ext cx="7671600" cy="760320"/>
+            <a:ext cx="7670880" cy="759600"/>
           </a:xfrm>
           <a:prstGeom prst="rect">
             <a:avLst/>
@@ -1634,8 +1635,8 @@
         </p:nvSpPr>
         <p:spPr>
           <a:xfrm>
-            <a:off x="5148000" y="6093360"/>
-            <a:ext cx="2735640" cy="394920"/>
+            <a:off x="5148000" y="5661360"/>
+            <a:ext cx="2734920" cy="394200"/>
           </a:xfrm>
           <a:prstGeom prst="rect">
             <a:avLst/>
@@ -1675,7 +1676,7 @@
         <p:spPr>
           <a:xfrm>
             <a:off x="0" y="2880000"/>
-            <a:ext cx="9144000" cy="432000"/>
+            <a:ext cx="9143280" cy="431280"/>
           </a:xfrm>
           <a:prstGeom prst="rect">
             <a:avLst/>
@@ -1700,7 +1701,7 @@
         <p:spPr>
           <a:xfrm>
             <a:off x="618480" y="3246480"/>
-            <a:ext cx="7776000" cy="912960"/>
+            <a:ext cx="7775280" cy="912240"/>
           </a:xfrm>
           <a:prstGeom prst="rect">
             <a:avLst/>
@@ -1766,7 +1767,7 @@
         <p:spPr>
           <a:xfrm>
             <a:off x="611640" y="4211640"/>
-            <a:ext cx="7776000" cy="638640"/>
+            <a:ext cx="7775280" cy="637920"/>
           </a:xfrm>
           <a:prstGeom prst="rect">
             <a:avLst/>
@@ -1814,7 +1815,7 @@
         <p:spPr>
           <a:xfrm>
             <a:off x="432000" y="2367360"/>
-            <a:ext cx="7848000" cy="638640"/>
+            <a:ext cx="7847280" cy="637920"/>
           </a:xfrm>
           <a:prstGeom prst="rect">
             <a:avLst/>
@@ -1854,7 +1855,7 @@
         <p:spPr>
           <a:xfrm>
             <a:off x="0" y="3816000"/>
-            <a:ext cx="9144000" cy="432000"/>
+            <a:ext cx="9143280" cy="431280"/>
           </a:xfrm>
           <a:prstGeom prst="rect">
             <a:avLst/>
@@ -1879,7 +1880,32 @@
         <p:spPr>
           <a:xfrm>
             <a:off x="-720" y="4536000"/>
-            <a:ext cx="4608720" cy="612000"/>
+            <a:ext cx="4608000" cy="611280"/>
+          </a:xfrm>
+          <a:prstGeom prst="rect">
+            <a:avLst/>
+          </a:prstGeom>
+          <a:solidFill>
+            <a:srgbClr val="000000"/>
+          </a:solidFill>
+          <a:ln w="6480">
+            <a:solidFill>
+              <a:srgbClr val="000000"/>
+            </a:solidFill>
+            <a:round/>
+          </a:ln>
+        </p:spPr>
+      </p:sp>
+      <p:sp>
+        <p:nvSpPr>
+          <p:cNvPr id="51" name="CustomShape 12"/>
+          <p:cNvSpPr/>
+          <p:nvPr/>
+        </p:nvSpPr>
+        <p:spPr>
+          <a:xfrm>
+            <a:off x="-720" y="6120000"/>
+            <a:ext cx="9144000" cy="738000"/>
           </a:xfrm>
           <a:prstGeom prst="rect">
             <a:avLst/>

</xml_diff>

<commit_message>
consertados erros de UTF, e erros de criação de eventos com siglas e nomes já cadastrados
</commit_message>
<xml_diff>
--- a/sistema-seven/web/resources/template.pptx
+++ b/sistema-seven/web/resources/template.pptx
@@ -1,19 +1,114 @@
 
 <file path=ppt/presentation.xml><?xml version="1.0" encoding="utf-8"?>
-<p:presentation xmlns:a="http://schemas.openxmlformats.org/drawingml/2006/main" xmlns:p="http://schemas.openxmlformats.org/presentationml/2006/main" xmlns:r="http://schemas.openxmlformats.org/officeDocument/2006/relationships">
+<p:presentation xmlns:a="http://schemas.openxmlformats.org/drawingml/2006/main" xmlns:r="http://schemas.openxmlformats.org/officeDocument/2006/relationships" xmlns:p="http://schemas.openxmlformats.org/presentationml/2006/main">
   <p:sldMasterIdLst>
-    <p:sldMasterId id="2147483648" r:id="rId2"/>
+    <p:sldMasterId id="2147483648" r:id="rId1"/>
   </p:sldMasterIdLst>
   <p:sldIdLst>
-    <p:sldId id="256" r:id="rId3"/>
+    <p:sldId id="256" r:id="rId2"/>
   </p:sldIdLst>
-  <p:sldSz cx="9144000" cy="6858000"/>
-  <p:notesSz cx="7559675" cy="10691812"/>
+  <p:sldSz cx="9144000" cy="6858000" type="screen4x3"/>
+  <p:notesSz cx="7559675" cy="10691813"/>
+  <p:defaultTextStyle>
+    <a:defPPr>
+      <a:defRPr lang="pt-BR"/>
+    </a:defPPr>
+    <a:lvl1pPr marL="0" algn="l" defTabSz="914400" rtl="0" eaLnBrk="1" latinLnBrk="0" hangingPunct="1">
+      <a:defRPr sz="1800" kern="1200">
+        <a:solidFill>
+          <a:schemeClr val="tx1"/>
+        </a:solidFill>
+        <a:latin typeface="+mn-lt"/>
+        <a:ea typeface="+mn-ea"/>
+        <a:cs typeface="+mn-cs"/>
+      </a:defRPr>
+    </a:lvl1pPr>
+    <a:lvl2pPr marL="457200" algn="l" defTabSz="914400" rtl="0" eaLnBrk="1" latinLnBrk="0" hangingPunct="1">
+      <a:defRPr sz="1800" kern="1200">
+        <a:solidFill>
+          <a:schemeClr val="tx1"/>
+        </a:solidFill>
+        <a:latin typeface="+mn-lt"/>
+        <a:ea typeface="+mn-ea"/>
+        <a:cs typeface="+mn-cs"/>
+      </a:defRPr>
+    </a:lvl2pPr>
+    <a:lvl3pPr marL="914400" algn="l" defTabSz="914400" rtl="0" eaLnBrk="1" latinLnBrk="0" hangingPunct="1">
+      <a:defRPr sz="1800" kern="1200">
+        <a:solidFill>
+          <a:schemeClr val="tx1"/>
+        </a:solidFill>
+        <a:latin typeface="+mn-lt"/>
+        <a:ea typeface="+mn-ea"/>
+        <a:cs typeface="+mn-cs"/>
+      </a:defRPr>
+    </a:lvl3pPr>
+    <a:lvl4pPr marL="1371600" algn="l" defTabSz="914400" rtl="0" eaLnBrk="1" latinLnBrk="0" hangingPunct="1">
+      <a:defRPr sz="1800" kern="1200">
+        <a:solidFill>
+          <a:schemeClr val="tx1"/>
+        </a:solidFill>
+        <a:latin typeface="+mn-lt"/>
+        <a:ea typeface="+mn-ea"/>
+        <a:cs typeface="+mn-cs"/>
+      </a:defRPr>
+    </a:lvl4pPr>
+    <a:lvl5pPr marL="1828800" algn="l" defTabSz="914400" rtl="0" eaLnBrk="1" latinLnBrk="0" hangingPunct="1">
+      <a:defRPr sz="1800" kern="1200">
+        <a:solidFill>
+          <a:schemeClr val="tx1"/>
+        </a:solidFill>
+        <a:latin typeface="+mn-lt"/>
+        <a:ea typeface="+mn-ea"/>
+        <a:cs typeface="+mn-cs"/>
+      </a:defRPr>
+    </a:lvl5pPr>
+    <a:lvl6pPr marL="2286000" algn="l" defTabSz="914400" rtl="0" eaLnBrk="1" latinLnBrk="0" hangingPunct="1">
+      <a:defRPr sz="1800" kern="1200">
+        <a:solidFill>
+          <a:schemeClr val="tx1"/>
+        </a:solidFill>
+        <a:latin typeface="+mn-lt"/>
+        <a:ea typeface="+mn-ea"/>
+        <a:cs typeface="+mn-cs"/>
+      </a:defRPr>
+    </a:lvl6pPr>
+    <a:lvl7pPr marL="2743200" algn="l" defTabSz="914400" rtl="0" eaLnBrk="1" latinLnBrk="0" hangingPunct="1">
+      <a:defRPr sz="1800" kern="1200">
+        <a:solidFill>
+          <a:schemeClr val="tx1"/>
+        </a:solidFill>
+        <a:latin typeface="+mn-lt"/>
+        <a:ea typeface="+mn-ea"/>
+        <a:cs typeface="+mn-cs"/>
+      </a:defRPr>
+    </a:lvl7pPr>
+    <a:lvl8pPr marL="3200400" algn="l" defTabSz="914400" rtl="0" eaLnBrk="1" latinLnBrk="0" hangingPunct="1">
+      <a:defRPr sz="1800" kern="1200">
+        <a:solidFill>
+          <a:schemeClr val="tx1"/>
+        </a:solidFill>
+        <a:latin typeface="+mn-lt"/>
+        <a:ea typeface="+mn-ea"/>
+        <a:cs typeface="+mn-cs"/>
+      </a:defRPr>
+    </a:lvl8pPr>
+    <a:lvl9pPr marL="3657600" algn="l" defTabSz="914400" rtl="0" eaLnBrk="1" latinLnBrk="0" hangingPunct="1">
+      <a:defRPr sz="1800" kern="1200">
+        <a:solidFill>
+          <a:schemeClr val="tx1"/>
+        </a:solidFill>
+        <a:latin typeface="+mn-lt"/>
+        <a:ea typeface="+mn-ea"/>
+        <a:cs typeface="+mn-cs"/>
+      </a:defRPr>
+    </a:lvl9pPr>
+  </p:defaultTextStyle>
 </p:presentation>
 </file>
 
 <file path=ppt/slideLayouts/slideLayout1.xml><?xml version="1.0" encoding="utf-8"?>
-<p:sldLayout xmlns:a="http://schemas.openxmlformats.org/drawingml/2006/main" xmlns:p="http://schemas.openxmlformats.org/presentationml/2006/main" xmlns:r="http://schemas.openxmlformats.org/officeDocument/2006/relationships" type="blank" preserve="1">
+<p:sldLayout xmlns:a="http://schemas.openxmlformats.org/drawingml/2006/main" xmlns:r="http://schemas.openxmlformats.org/officeDocument/2006/relationships" xmlns:p="http://schemas.openxmlformats.org/presentationml/2006/main" type="blank" preserve="1">
   <p:cSld name="Blank Slide">
     <p:spTree>
       <p:nvGrpSpPr>
@@ -31,11 +126,14 @@
       </p:grpSpPr>
     </p:spTree>
   </p:cSld>
+  <p:clrMapOvr>
+    <a:masterClrMapping/>
+  </p:clrMapOvr>
 </p:sldLayout>
 </file>
 
 <file path=ppt/slideLayouts/slideLayout10.xml><?xml version="1.0" encoding="utf-8"?>
-<p:sldLayout xmlns:a="http://schemas.openxmlformats.org/drawingml/2006/main" xmlns:p="http://schemas.openxmlformats.org/presentationml/2006/main" xmlns:r="http://schemas.openxmlformats.org/officeDocument/2006/relationships" type="objOverTx" preserve="1">
+<p:sldLayout xmlns:a="http://schemas.openxmlformats.org/drawingml/2006/main" xmlns:r="http://schemas.openxmlformats.org/officeDocument/2006/relationships" xmlns:p="http://schemas.openxmlformats.org/presentationml/2006/main" type="objOverTx" preserve="1">
   <p:cSld name="Title, Content over Content">
     <p:spTree>
       <p:nvGrpSpPr>
@@ -63,15 +161,16 @@
         </p:nvSpPr>
         <p:spPr>
           <a:xfrm>
-            <a:off x="457200" y="273600"/>
-            <a:ext cx="8229240" cy="1145160"/>
-          </a:xfrm>
-          <a:prstGeom prst="rect">
-            <a:avLst/>
-          </a:prstGeom>
-        </p:spPr>
-        <p:txBody>
-          <a:bodyPr lIns="0" rIns="0" tIns="0" bIns="0" anchor="ctr"/>
+            <a:off x="685800" y="2130480"/>
+            <a:ext cx="7771680" cy="1469880"/>
+          </a:xfrm>
+          <a:prstGeom prst="rect">
+            <a:avLst/>
+          </a:prstGeom>
+        </p:spPr>
+        <p:txBody>
+          <a:bodyPr lIns="0" tIns="0" rIns="0" bIns="0" anchor="ctr"/>
+          <a:lstStyle/>
           <a:p>
             <a:pPr algn="ctr"/>
             <a:endParaRPr/>
@@ -98,7 +197,8 @@
           </a:prstGeom>
         </p:spPr>
         <p:txBody>
-          <a:bodyPr lIns="0" rIns="0" tIns="0" bIns="0"/>
+          <a:bodyPr lIns="0" tIns="0" rIns="0" bIns="0"/>
+          <a:lstStyle/>
           <a:p>
             <a:endParaRPr/>
           </a:p>
@@ -124,7 +224,8 @@
           </a:prstGeom>
         </p:spPr>
         <p:txBody>
-          <a:bodyPr lIns="0" rIns="0" tIns="0" bIns="0"/>
+          <a:bodyPr lIns="0" tIns="0" rIns="0" bIns="0"/>
+          <a:lstStyle/>
           <a:p>
             <a:endParaRPr/>
           </a:p>
@@ -132,11 +233,14 @@
       </p:sp>
     </p:spTree>
   </p:cSld>
+  <p:clrMapOvr>
+    <a:masterClrMapping/>
+  </p:clrMapOvr>
 </p:sldLayout>
 </file>
 
 <file path=ppt/slideLayouts/slideLayout11.xml><?xml version="1.0" encoding="utf-8"?>
-<p:sldLayout xmlns:a="http://schemas.openxmlformats.org/drawingml/2006/main" xmlns:p="http://schemas.openxmlformats.org/presentationml/2006/main" xmlns:r="http://schemas.openxmlformats.org/officeDocument/2006/relationships" type="fourObj" preserve="1">
+<p:sldLayout xmlns:a="http://schemas.openxmlformats.org/drawingml/2006/main" xmlns:r="http://schemas.openxmlformats.org/officeDocument/2006/relationships" xmlns:p="http://schemas.openxmlformats.org/presentationml/2006/main" type="fourObj" preserve="1">
   <p:cSld name="Title, 4 Content">
     <p:spTree>
       <p:nvGrpSpPr>
@@ -164,15 +268,16 @@
         </p:nvSpPr>
         <p:spPr>
           <a:xfrm>
-            <a:off x="457200" y="273600"/>
-            <a:ext cx="8229240" cy="1145160"/>
-          </a:xfrm>
-          <a:prstGeom prst="rect">
-            <a:avLst/>
-          </a:prstGeom>
-        </p:spPr>
-        <p:txBody>
-          <a:bodyPr lIns="0" rIns="0" tIns="0" bIns="0" anchor="ctr"/>
+            <a:off x="685800" y="2130480"/>
+            <a:ext cx="7771680" cy="1469880"/>
+          </a:xfrm>
+          <a:prstGeom prst="rect">
+            <a:avLst/>
+          </a:prstGeom>
+        </p:spPr>
+        <p:txBody>
+          <a:bodyPr lIns="0" tIns="0" rIns="0" bIns="0" anchor="ctr"/>
+          <a:lstStyle/>
           <a:p>
             <a:pPr algn="ctr"/>
             <a:endParaRPr/>
@@ -199,7 +304,8 @@
           </a:prstGeom>
         </p:spPr>
         <p:txBody>
-          <a:bodyPr lIns="0" rIns="0" tIns="0" bIns="0"/>
+          <a:bodyPr lIns="0" tIns="0" rIns="0" bIns="0"/>
+          <a:lstStyle/>
           <a:p>
             <a:endParaRPr/>
           </a:p>
@@ -225,7 +331,8 @@
           </a:prstGeom>
         </p:spPr>
         <p:txBody>
-          <a:bodyPr lIns="0" rIns="0" tIns="0" bIns="0"/>
+          <a:bodyPr lIns="0" tIns="0" rIns="0" bIns="0"/>
+          <a:lstStyle/>
           <a:p>
             <a:endParaRPr/>
           </a:p>
@@ -251,7 +358,8 @@
           </a:prstGeom>
         </p:spPr>
         <p:txBody>
-          <a:bodyPr lIns="0" rIns="0" tIns="0" bIns="0"/>
+          <a:bodyPr lIns="0" tIns="0" rIns="0" bIns="0"/>
+          <a:lstStyle/>
           <a:p>
             <a:endParaRPr/>
           </a:p>
@@ -277,7 +385,8 @@
           </a:prstGeom>
         </p:spPr>
         <p:txBody>
-          <a:bodyPr lIns="0" rIns="0" tIns="0" bIns="0"/>
+          <a:bodyPr lIns="0" tIns="0" rIns="0" bIns="0"/>
+          <a:lstStyle/>
           <a:p>
             <a:endParaRPr/>
           </a:p>
@@ -285,11 +394,14 @@
       </p:sp>
     </p:spTree>
   </p:cSld>
+  <p:clrMapOvr>
+    <a:masterClrMapping/>
+  </p:clrMapOvr>
 </p:sldLayout>
 </file>
 
 <file path=ppt/slideLayouts/slideLayout12.xml><?xml version="1.0" encoding="utf-8"?>
-<p:sldLayout xmlns:a="http://schemas.openxmlformats.org/drawingml/2006/main" xmlns:p="http://schemas.openxmlformats.org/presentationml/2006/main" xmlns:r="http://schemas.openxmlformats.org/officeDocument/2006/relationships" type="blank" preserve="1">
+<p:sldLayout xmlns:a="http://schemas.openxmlformats.org/drawingml/2006/main" xmlns:r="http://schemas.openxmlformats.org/officeDocument/2006/relationships" xmlns:p="http://schemas.openxmlformats.org/presentationml/2006/main" type="blank" preserve="1">
   <p:cSld name="Title, 6 Content">
     <p:spTree>
       <p:nvGrpSpPr>
@@ -317,15 +429,16 @@
         </p:nvSpPr>
         <p:spPr>
           <a:xfrm>
-            <a:off x="457200" y="273600"/>
-            <a:ext cx="8229240" cy="1145160"/>
-          </a:xfrm>
-          <a:prstGeom prst="rect">
-            <a:avLst/>
-          </a:prstGeom>
-        </p:spPr>
-        <p:txBody>
-          <a:bodyPr lIns="0" rIns="0" tIns="0" bIns="0" anchor="ctr"/>
+            <a:off x="685800" y="2130480"/>
+            <a:ext cx="7771680" cy="1469880"/>
+          </a:xfrm>
+          <a:prstGeom prst="rect">
+            <a:avLst/>
+          </a:prstGeom>
+        </p:spPr>
+        <p:txBody>
+          <a:bodyPr lIns="0" tIns="0" rIns="0" bIns="0" anchor="ctr"/>
+          <a:lstStyle/>
           <a:p>
             <a:pPr algn="ctr"/>
             <a:endParaRPr/>
@@ -352,7 +465,8 @@
           </a:prstGeom>
         </p:spPr>
         <p:txBody>
-          <a:bodyPr lIns="0" rIns="0" tIns="0" bIns="0"/>
+          <a:bodyPr lIns="0" tIns="0" rIns="0" bIns="0"/>
+          <a:lstStyle/>
           <a:p>
             <a:endParaRPr/>
           </a:p>
@@ -378,7 +492,8 @@
           </a:prstGeom>
         </p:spPr>
         <p:txBody>
-          <a:bodyPr lIns="0" rIns="0" tIns="0" bIns="0"/>
+          <a:bodyPr lIns="0" tIns="0" rIns="0" bIns="0"/>
+          <a:lstStyle/>
           <a:p>
             <a:endParaRPr/>
           </a:p>
@@ -386,7 +501,7 @@
       </p:sp>
       <p:pic>
         <p:nvPicPr>
-          <p:cNvPr id="34" name="" descr=""/>
+          <p:cNvPr id="34" name="Imagem 33"/>
           <p:cNvPicPr/>
           <p:nvPr/>
         </p:nvPicPr>
@@ -411,12 +526,12 @@
       </p:pic>
       <p:pic>
         <p:nvPicPr>
-          <p:cNvPr id="35" name="" descr=""/>
+          <p:cNvPr id="35" name="Imagem 34"/>
           <p:cNvPicPr/>
           <p:nvPr/>
         </p:nvPicPr>
         <p:blipFill>
-          <a:blip r:embed="rId3"/>
+          <a:blip r:embed="rId2"/>
           <a:stretch>
             <a:fillRect/>
           </a:stretch>
@@ -436,11 +551,14 @@
       </p:pic>
     </p:spTree>
   </p:cSld>
+  <p:clrMapOvr>
+    <a:masterClrMapping/>
+  </p:clrMapOvr>
 </p:sldLayout>
 </file>
 
 <file path=ppt/slideLayouts/slideLayout2.xml><?xml version="1.0" encoding="utf-8"?>
-<p:sldLayout xmlns:a="http://schemas.openxmlformats.org/drawingml/2006/main" xmlns:p="http://schemas.openxmlformats.org/presentationml/2006/main" xmlns:r="http://schemas.openxmlformats.org/officeDocument/2006/relationships" type="tx" preserve="1">
+<p:sldLayout xmlns:a="http://schemas.openxmlformats.org/drawingml/2006/main" xmlns:r="http://schemas.openxmlformats.org/officeDocument/2006/relationships" xmlns:p="http://schemas.openxmlformats.org/presentationml/2006/main" type="tx" preserve="1">
   <p:cSld name="Title Slide">
     <p:spTree>
       <p:nvGrpSpPr>
@@ -468,15 +586,16 @@
         </p:nvSpPr>
         <p:spPr>
           <a:xfrm>
-            <a:off x="457200" y="273600"/>
-            <a:ext cx="8229240" cy="1145160"/>
-          </a:xfrm>
-          <a:prstGeom prst="rect">
-            <a:avLst/>
-          </a:prstGeom>
-        </p:spPr>
-        <p:txBody>
-          <a:bodyPr lIns="0" rIns="0" tIns="0" bIns="0" anchor="ctr"/>
+            <a:off x="685800" y="2130480"/>
+            <a:ext cx="7771680" cy="1469880"/>
+          </a:xfrm>
+          <a:prstGeom prst="rect">
+            <a:avLst/>
+          </a:prstGeom>
+        </p:spPr>
+        <p:txBody>
+          <a:bodyPr lIns="0" tIns="0" rIns="0" bIns="0" anchor="ctr"/>
+          <a:lstStyle/>
           <a:p>
             <a:pPr algn="ctr"/>
             <a:endParaRPr/>
@@ -503,7 +622,8 @@
           </a:prstGeom>
         </p:spPr>
         <p:txBody>
-          <a:bodyPr lIns="0" rIns="0" tIns="0" bIns="0" anchor="ctr"/>
+          <a:bodyPr lIns="0" tIns="0" rIns="0" bIns="0" anchor="ctr"/>
+          <a:lstStyle/>
           <a:p>
             <a:pPr algn="ctr"/>
             <a:endParaRPr/>
@@ -512,11 +632,14 @@
       </p:sp>
     </p:spTree>
   </p:cSld>
+  <p:clrMapOvr>
+    <a:masterClrMapping/>
+  </p:clrMapOvr>
 </p:sldLayout>
 </file>
 
 <file path=ppt/slideLayouts/slideLayout3.xml><?xml version="1.0" encoding="utf-8"?>
-<p:sldLayout xmlns:a="http://schemas.openxmlformats.org/drawingml/2006/main" xmlns:p="http://schemas.openxmlformats.org/presentationml/2006/main" xmlns:r="http://schemas.openxmlformats.org/officeDocument/2006/relationships" type="obj" preserve="1">
+<p:sldLayout xmlns:a="http://schemas.openxmlformats.org/drawingml/2006/main" xmlns:r="http://schemas.openxmlformats.org/officeDocument/2006/relationships" xmlns:p="http://schemas.openxmlformats.org/presentationml/2006/main" type="obj" preserve="1">
   <p:cSld name="Title, Content">
     <p:spTree>
       <p:nvGrpSpPr>
@@ -544,15 +667,16 @@
         </p:nvSpPr>
         <p:spPr>
           <a:xfrm>
-            <a:off x="457200" y="273600"/>
-            <a:ext cx="8229240" cy="1145160"/>
-          </a:xfrm>
-          <a:prstGeom prst="rect">
-            <a:avLst/>
-          </a:prstGeom>
-        </p:spPr>
-        <p:txBody>
-          <a:bodyPr lIns="0" rIns="0" tIns="0" bIns="0" anchor="ctr"/>
+            <a:off x="685800" y="2130480"/>
+            <a:ext cx="7771680" cy="1469880"/>
+          </a:xfrm>
+          <a:prstGeom prst="rect">
+            <a:avLst/>
+          </a:prstGeom>
+        </p:spPr>
+        <p:txBody>
+          <a:bodyPr lIns="0" tIns="0" rIns="0" bIns="0" anchor="ctr"/>
+          <a:lstStyle/>
           <a:p>
             <a:pPr algn="ctr"/>
             <a:endParaRPr/>
@@ -579,7 +703,8 @@
           </a:prstGeom>
         </p:spPr>
         <p:txBody>
-          <a:bodyPr lIns="0" rIns="0" tIns="0" bIns="0"/>
+          <a:bodyPr lIns="0" tIns="0" rIns="0" bIns="0"/>
+          <a:lstStyle/>
           <a:p>
             <a:endParaRPr/>
           </a:p>
@@ -587,11 +712,14 @@
       </p:sp>
     </p:spTree>
   </p:cSld>
+  <p:clrMapOvr>
+    <a:masterClrMapping/>
+  </p:clrMapOvr>
 </p:sldLayout>
 </file>
 
 <file path=ppt/slideLayouts/slideLayout4.xml><?xml version="1.0" encoding="utf-8"?>
-<p:sldLayout xmlns:a="http://schemas.openxmlformats.org/drawingml/2006/main" xmlns:p="http://schemas.openxmlformats.org/presentationml/2006/main" xmlns:r="http://schemas.openxmlformats.org/officeDocument/2006/relationships" type="twoObj" preserve="1">
+<p:sldLayout xmlns:a="http://schemas.openxmlformats.org/drawingml/2006/main" xmlns:r="http://schemas.openxmlformats.org/officeDocument/2006/relationships" xmlns:p="http://schemas.openxmlformats.org/presentationml/2006/main" type="twoObj" preserve="1">
   <p:cSld name="Title, 2 Content">
     <p:spTree>
       <p:nvGrpSpPr>
@@ -619,15 +747,16 @@
         </p:nvSpPr>
         <p:spPr>
           <a:xfrm>
-            <a:off x="457200" y="273600"/>
-            <a:ext cx="8229240" cy="1145160"/>
-          </a:xfrm>
-          <a:prstGeom prst="rect">
-            <a:avLst/>
-          </a:prstGeom>
-        </p:spPr>
-        <p:txBody>
-          <a:bodyPr lIns="0" rIns="0" tIns="0" bIns="0" anchor="ctr"/>
+            <a:off x="685800" y="2130480"/>
+            <a:ext cx="7771680" cy="1469880"/>
+          </a:xfrm>
+          <a:prstGeom prst="rect">
+            <a:avLst/>
+          </a:prstGeom>
+        </p:spPr>
+        <p:txBody>
+          <a:bodyPr lIns="0" tIns="0" rIns="0" bIns="0" anchor="ctr"/>
+          <a:lstStyle/>
           <a:p>
             <a:pPr algn="ctr"/>
             <a:endParaRPr/>
@@ -654,7 +783,8 @@
           </a:prstGeom>
         </p:spPr>
         <p:txBody>
-          <a:bodyPr lIns="0" rIns="0" tIns="0" bIns="0"/>
+          <a:bodyPr lIns="0" tIns="0" rIns="0" bIns="0"/>
+          <a:lstStyle/>
           <a:p>
             <a:endParaRPr/>
           </a:p>
@@ -680,7 +810,8 @@
           </a:prstGeom>
         </p:spPr>
         <p:txBody>
-          <a:bodyPr lIns="0" rIns="0" tIns="0" bIns="0"/>
+          <a:bodyPr lIns="0" tIns="0" rIns="0" bIns="0"/>
+          <a:lstStyle/>
           <a:p>
             <a:endParaRPr/>
           </a:p>
@@ -688,11 +819,14 @@
       </p:sp>
     </p:spTree>
   </p:cSld>
+  <p:clrMapOvr>
+    <a:masterClrMapping/>
+  </p:clrMapOvr>
 </p:sldLayout>
 </file>
 
 <file path=ppt/slideLayouts/slideLayout5.xml><?xml version="1.0" encoding="utf-8"?>
-<p:sldLayout xmlns:a="http://schemas.openxmlformats.org/drawingml/2006/main" xmlns:p="http://schemas.openxmlformats.org/presentationml/2006/main" xmlns:r="http://schemas.openxmlformats.org/officeDocument/2006/relationships" type="titleOnly" preserve="1">
+<p:sldLayout xmlns:a="http://schemas.openxmlformats.org/drawingml/2006/main" xmlns:r="http://schemas.openxmlformats.org/officeDocument/2006/relationships" xmlns:p="http://schemas.openxmlformats.org/presentationml/2006/main" type="titleOnly" preserve="1">
   <p:cSld name="Title Only">
     <p:spTree>
       <p:nvGrpSpPr>
@@ -720,15 +854,16 @@
         </p:nvSpPr>
         <p:spPr>
           <a:xfrm>
-            <a:off x="457200" y="273600"/>
-            <a:ext cx="8229240" cy="1145160"/>
-          </a:xfrm>
-          <a:prstGeom prst="rect">
-            <a:avLst/>
-          </a:prstGeom>
-        </p:spPr>
-        <p:txBody>
-          <a:bodyPr lIns="0" rIns="0" tIns="0" bIns="0" anchor="ctr"/>
+            <a:off x="685800" y="2130480"/>
+            <a:ext cx="7771680" cy="1469880"/>
+          </a:xfrm>
+          <a:prstGeom prst="rect">
+            <a:avLst/>
+          </a:prstGeom>
+        </p:spPr>
+        <p:txBody>
+          <a:bodyPr lIns="0" tIns="0" rIns="0" bIns="0" anchor="ctr"/>
+          <a:lstStyle/>
           <a:p>
             <a:pPr algn="ctr"/>
             <a:endParaRPr/>
@@ -737,11 +872,14 @@
       </p:sp>
     </p:spTree>
   </p:cSld>
+  <p:clrMapOvr>
+    <a:masterClrMapping/>
+  </p:clrMapOvr>
 </p:sldLayout>
 </file>
 
 <file path=ppt/slideLayouts/slideLayout6.xml><?xml version="1.0" encoding="utf-8"?>
-<p:sldLayout xmlns:a="http://schemas.openxmlformats.org/drawingml/2006/main" xmlns:p="http://schemas.openxmlformats.org/presentationml/2006/main" xmlns:r="http://schemas.openxmlformats.org/officeDocument/2006/relationships" type="objOnly" preserve="1">
+<p:sldLayout xmlns:a="http://schemas.openxmlformats.org/drawingml/2006/main" xmlns:r="http://schemas.openxmlformats.org/officeDocument/2006/relationships" xmlns:p="http://schemas.openxmlformats.org/presentationml/2006/main" type="objOnly" preserve="1">
   <p:cSld name="Centered Text">
     <p:spTree>
       <p:nvGrpSpPr>
@@ -769,15 +907,16 @@
         </p:nvSpPr>
         <p:spPr>
           <a:xfrm>
-            <a:off x="457200" y="273600"/>
-            <a:ext cx="8229240" cy="5308200"/>
-          </a:xfrm>
-          <a:prstGeom prst="rect">
-            <a:avLst/>
-          </a:prstGeom>
-        </p:spPr>
-        <p:txBody>
-          <a:bodyPr lIns="0" rIns="0" tIns="0" bIns="0" anchor="ctr"/>
+            <a:off x="685800" y="2130480"/>
+            <a:ext cx="7771680" cy="6813360"/>
+          </a:xfrm>
+          <a:prstGeom prst="rect">
+            <a:avLst/>
+          </a:prstGeom>
+        </p:spPr>
+        <p:txBody>
+          <a:bodyPr lIns="0" tIns="0" rIns="0" bIns="0" anchor="ctr"/>
+          <a:lstStyle/>
           <a:p>
             <a:pPr algn="ctr"/>
             <a:endParaRPr/>
@@ -786,11 +925,14 @@
       </p:sp>
     </p:spTree>
   </p:cSld>
+  <p:clrMapOvr>
+    <a:masterClrMapping/>
+  </p:clrMapOvr>
 </p:sldLayout>
 </file>
 
 <file path=ppt/slideLayouts/slideLayout7.xml><?xml version="1.0" encoding="utf-8"?>
-<p:sldLayout xmlns:a="http://schemas.openxmlformats.org/drawingml/2006/main" xmlns:p="http://schemas.openxmlformats.org/presentationml/2006/main" xmlns:r="http://schemas.openxmlformats.org/officeDocument/2006/relationships" type="twoObjAndObj" preserve="1">
+<p:sldLayout xmlns:a="http://schemas.openxmlformats.org/drawingml/2006/main" xmlns:r="http://schemas.openxmlformats.org/officeDocument/2006/relationships" xmlns:p="http://schemas.openxmlformats.org/presentationml/2006/main" type="twoObjAndObj" preserve="1">
   <p:cSld name="Title, 2 Content and Content">
     <p:spTree>
       <p:nvGrpSpPr>
@@ -818,15 +960,16 @@
         </p:nvSpPr>
         <p:spPr>
           <a:xfrm>
-            <a:off x="457200" y="273600"/>
-            <a:ext cx="8229240" cy="1145160"/>
-          </a:xfrm>
-          <a:prstGeom prst="rect">
-            <a:avLst/>
-          </a:prstGeom>
-        </p:spPr>
-        <p:txBody>
-          <a:bodyPr lIns="0" rIns="0" tIns="0" bIns="0" anchor="ctr"/>
+            <a:off x="685800" y="2130480"/>
+            <a:ext cx="7771680" cy="1469880"/>
+          </a:xfrm>
+          <a:prstGeom prst="rect">
+            <a:avLst/>
+          </a:prstGeom>
+        </p:spPr>
+        <p:txBody>
+          <a:bodyPr lIns="0" tIns="0" rIns="0" bIns="0" anchor="ctr"/>
+          <a:lstStyle/>
           <a:p>
             <a:pPr algn="ctr"/>
             <a:endParaRPr/>
@@ -853,7 +996,8 @@
           </a:prstGeom>
         </p:spPr>
         <p:txBody>
-          <a:bodyPr lIns="0" rIns="0" tIns="0" bIns="0"/>
+          <a:bodyPr lIns="0" tIns="0" rIns="0" bIns="0"/>
+          <a:lstStyle/>
           <a:p>
             <a:endParaRPr/>
           </a:p>
@@ -879,7 +1023,8 @@
           </a:prstGeom>
         </p:spPr>
         <p:txBody>
-          <a:bodyPr lIns="0" rIns="0" tIns="0" bIns="0"/>
+          <a:bodyPr lIns="0" tIns="0" rIns="0" bIns="0"/>
+          <a:lstStyle/>
           <a:p>
             <a:endParaRPr/>
           </a:p>
@@ -905,7 +1050,8 @@
           </a:prstGeom>
         </p:spPr>
         <p:txBody>
-          <a:bodyPr lIns="0" rIns="0" tIns="0" bIns="0"/>
+          <a:bodyPr lIns="0" tIns="0" rIns="0" bIns="0"/>
+          <a:lstStyle/>
           <a:p>
             <a:endParaRPr/>
           </a:p>
@@ -913,11 +1059,14 @@
       </p:sp>
     </p:spTree>
   </p:cSld>
+  <p:clrMapOvr>
+    <a:masterClrMapping/>
+  </p:clrMapOvr>
 </p:sldLayout>
 </file>
 
 <file path=ppt/slideLayouts/slideLayout8.xml><?xml version="1.0" encoding="utf-8"?>
-<p:sldLayout xmlns:a="http://schemas.openxmlformats.org/drawingml/2006/main" xmlns:p="http://schemas.openxmlformats.org/presentationml/2006/main" xmlns:r="http://schemas.openxmlformats.org/officeDocument/2006/relationships" type="objAndTwoObj" preserve="1">
+<p:sldLayout xmlns:a="http://schemas.openxmlformats.org/drawingml/2006/main" xmlns:r="http://schemas.openxmlformats.org/officeDocument/2006/relationships" xmlns:p="http://schemas.openxmlformats.org/presentationml/2006/main" type="objAndTwoObj" preserve="1">
   <p:cSld name="Title Content and 2 Content">
     <p:spTree>
       <p:nvGrpSpPr>
@@ -945,15 +1094,16 @@
         </p:nvSpPr>
         <p:spPr>
           <a:xfrm>
-            <a:off x="457200" y="273600"/>
-            <a:ext cx="8229240" cy="1145160"/>
-          </a:xfrm>
-          <a:prstGeom prst="rect">
-            <a:avLst/>
-          </a:prstGeom>
-        </p:spPr>
-        <p:txBody>
-          <a:bodyPr lIns="0" rIns="0" tIns="0" bIns="0" anchor="ctr"/>
+            <a:off x="685800" y="2130480"/>
+            <a:ext cx="7771680" cy="1469880"/>
+          </a:xfrm>
+          <a:prstGeom prst="rect">
+            <a:avLst/>
+          </a:prstGeom>
+        </p:spPr>
+        <p:txBody>
+          <a:bodyPr lIns="0" tIns="0" rIns="0" bIns="0" anchor="ctr"/>
+          <a:lstStyle/>
           <a:p>
             <a:pPr algn="ctr"/>
             <a:endParaRPr/>
@@ -980,7 +1130,8 @@
           </a:prstGeom>
         </p:spPr>
         <p:txBody>
-          <a:bodyPr lIns="0" rIns="0" tIns="0" bIns="0"/>
+          <a:bodyPr lIns="0" tIns="0" rIns="0" bIns="0"/>
+          <a:lstStyle/>
           <a:p>
             <a:endParaRPr/>
           </a:p>
@@ -1006,7 +1157,8 @@
           </a:prstGeom>
         </p:spPr>
         <p:txBody>
-          <a:bodyPr lIns="0" rIns="0" tIns="0" bIns="0"/>
+          <a:bodyPr lIns="0" tIns="0" rIns="0" bIns="0"/>
+          <a:lstStyle/>
           <a:p>
             <a:endParaRPr/>
           </a:p>
@@ -1032,7 +1184,8 @@
           </a:prstGeom>
         </p:spPr>
         <p:txBody>
-          <a:bodyPr lIns="0" rIns="0" tIns="0" bIns="0"/>
+          <a:bodyPr lIns="0" tIns="0" rIns="0" bIns="0"/>
+          <a:lstStyle/>
           <a:p>
             <a:endParaRPr/>
           </a:p>
@@ -1040,11 +1193,14 @@
       </p:sp>
     </p:spTree>
   </p:cSld>
+  <p:clrMapOvr>
+    <a:masterClrMapping/>
+  </p:clrMapOvr>
 </p:sldLayout>
 </file>
 
 <file path=ppt/slideLayouts/slideLayout9.xml><?xml version="1.0" encoding="utf-8"?>
-<p:sldLayout xmlns:a="http://schemas.openxmlformats.org/drawingml/2006/main" xmlns:p="http://schemas.openxmlformats.org/presentationml/2006/main" xmlns:r="http://schemas.openxmlformats.org/officeDocument/2006/relationships" type="twoObjOverTx" preserve="1">
+<p:sldLayout xmlns:a="http://schemas.openxmlformats.org/drawingml/2006/main" xmlns:r="http://schemas.openxmlformats.org/officeDocument/2006/relationships" xmlns:p="http://schemas.openxmlformats.org/presentationml/2006/main" type="twoObjOverTx" preserve="1">
   <p:cSld name="Title, 2 Content over Content">
     <p:spTree>
       <p:nvGrpSpPr>
@@ -1072,15 +1228,16 @@
         </p:nvSpPr>
         <p:spPr>
           <a:xfrm>
-            <a:off x="457200" y="273600"/>
-            <a:ext cx="8229240" cy="1145160"/>
-          </a:xfrm>
-          <a:prstGeom prst="rect">
-            <a:avLst/>
-          </a:prstGeom>
-        </p:spPr>
-        <p:txBody>
-          <a:bodyPr lIns="0" rIns="0" tIns="0" bIns="0" anchor="ctr"/>
+            <a:off x="685800" y="2130480"/>
+            <a:ext cx="7771680" cy="1469880"/>
+          </a:xfrm>
+          <a:prstGeom prst="rect">
+            <a:avLst/>
+          </a:prstGeom>
+        </p:spPr>
+        <p:txBody>
+          <a:bodyPr lIns="0" tIns="0" rIns="0" bIns="0" anchor="ctr"/>
+          <a:lstStyle/>
           <a:p>
             <a:pPr algn="ctr"/>
             <a:endParaRPr/>
@@ -1107,7 +1264,8 @@
           </a:prstGeom>
         </p:spPr>
         <p:txBody>
-          <a:bodyPr lIns="0" rIns="0" tIns="0" bIns="0"/>
+          <a:bodyPr lIns="0" tIns="0" rIns="0" bIns="0"/>
+          <a:lstStyle/>
           <a:p>
             <a:endParaRPr/>
           </a:p>
@@ -1133,7 +1291,8 @@
           </a:prstGeom>
         </p:spPr>
         <p:txBody>
-          <a:bodyPr lIns="0" rIns="0" tIns="0" bIns="0"/>
+          <a:bodyPr lIns="0" tIns="0" rIns="0" bIns="0"/>
+          <a:lstStyle/>
           <a:p>
             <a:endParaRPr/>
           </a:p>
@@ -1159,7 +1318,8 @@
           </a:prstGeom>
         </p:spPr>
         <p:txBody>
-          <a:bodyPr lIns="0" rIns="0" tIns="0" bIns="0"/>
+          <a:bodyPr lIns="0" tIns="0" rIns="0" bIns="0"/>
+          <a:lstStyle/>
           <a:p>
             <a:endParaRPr/>
           </a:p>
@@ -1167,17 +1327,21 @@
       </p:sp>
     </p:spTree>
   </p:cSld>
+  <p:clrMapOvr>
+    <a:masterClrMapping/>
+  </p:clrMapOvr>
 </p:sldLayout>
 </file>
 
 <file path=ppt/slideMasters/slideMaster1.xml><?xml version="1.0" encoding="utf-8"?>
-<p:sldMaster xmlns:a="http://schemas.openxmlformats.org/drawingml/2006/main" xmlns:p="http://schemas.openxmlformats.org/presentationml/2006/main" xmlns:r="http://schemas.openxmlformats.org/officeDocument/2006/relationships">
+<p:sldMaster xmlns:a="http://schemas.openxmlformats.org/drawingml/2006/main" xmlns:r="http://schemas.openxmlformats.org/officeDocument/2006/relationships" xmlns:p="http://schemas.openxmlformats.org/presentationml/2006/main">
   <p:cSld>
     <p:bg>
       <p:bgPr>
         <a:solidFill>
-          <a:srgbClr val="ffffff"/>
+          <a:srgbClr val="FFFFFF"/>
         </a:solidFill>
+        <a:effectLst/>
       </p:bgPr>
     </p:bg>
     <p:spTree>
@@ -1196,7 +1360,7 @@
       </p:grpSpPr>
       <p:sp>
         <p:nvSpPr>
-          <p:cNvPr id="0" name="PlaceHolder 1"/>
+          <p:cNvPr id="2" name="PlaceHolder 1"/>
           <p:cNvSpPr>
             <a:spLocks noGrp="1"/>
           </p:cNvSpPr>
@@ -1206,22 +1370,22 @@
         </p:nvSpPr>
         <p:spPr>
           <a:xfrm>
-            <a:off x="457200" y="273600"/>
-            <a:ext cx="8229240" cy="1144800"/>
-          </a:xfrm>
-          <a:prstGeom prst="rect">
-            <a:avLst/>
-          </a:prstGeom>
-        </p:spPr>
-        <p:txBody>
-          <a:bodyPr lIns="0" rIns="0" tIns="0" bIns="0" anchor="ctr"/>
-          <a:p>
-            <a:pPr algn="ctr"/>
+            <a:off x="685800" y="2130480"/>
+            <a:ext cx="7771680" cy="1469520"/>
+          </a:xfrm>
+          <a:prstGeom prst="rect">
+            <a:avLst/>
+          </a:prstGeom>
+        </p:spPr>
+        <p:txBody>
+          <a:bodyPr lIns="0" tIns="0" rIns="0" bIns="0" anchor="ctr"/>
+          <a:lstStyle/>
+          <a:p>
             <a:r>
-              <a:rPr lang="pt-BR" sz="4400">
+              <a:rPr lang="pt-BR">
                 <a:latin typeface="Arial"/>
               </a:rPr>
-              <a:t>Clique para editar o formato do texto do título</a:t>
+              <a:t>Click to edit the title text format</a:t>
             </a:r>
             <a:endParaRPr/>
           </a:p>
@@ -1229,7 +1393,7 @@
       </p:sp>
       <p:sp>
         <p:nvSpPr>
-          <p:cNvPr id="1" name="PlaceHolder 2"/>
+          <p:cNvPr id="3" name="PlaceHolder 2"/>
           <p:cNvSpPr>
             <a:spLocks noGrp="1"/>
           </p:cNvSpPr>
@@ -1247,7 +1411,8 @@
           </a:prstGeom>
         </p:spPr>
         <p:txBody>
-          <a:bodyPr lIns="0" rIns="0" tIns="0" bIns="0"/>
+          <a:bodyPr lIns="0" tIns="0" rIns="0" bIns="0"/>
+          <a:lstStyle/>
           <a:p>
             <a:pPr>
               <a:buSzPct val="45000"/>
@@ -1258,7 +1423,7 @@
               <a:rPr lang="pt-BR" sz="3200">
                 <a:latin typeface="Arial"/>
               </a:rPr>
-              <a:t>Clique para editar o formato do texto da estrutura de tópicos</a:t>
+              <a:t>Click to edit the outline text format</a:t>
             </a:r>
             <a:endParaRPr/>
           </a:p>
@@ -1272,7 +1437,7 @@
               <a:rPr lang="pt-BR" sz="2800">
                 <a:latin typeface="Arial"/>
               </a:rPr>
-              <a:t>2.º Nível da estrutura de tópicos</a:t>
+              <a:t>Second Outline Level</a:t>
             </a:r>
             <a:endParaRPr/>
           </a:p>
@@ -1286,7 +1451,7 @@
               <a:rPr lang="pt-BR" sz="2400">
                 <a:latin typeface="Arial"/>
               </a:rPr>
-              <a:t>3.º Nível da estrutura de tópicos</a:t>
+              <a:t>Third Outline Level</a:t>
             </a:r>
             <a:endParaRPr/>
           </a:p>
@@ -1300,7 +1465,7 @@
               <a:rPr lang="pt-BR" sz="2000">
                 <a:latin typeface="Arial"/>
               </a:rPr>
-              <a:t>4.º Nível da estrutura de tópicos</a:t>
+              <a:t>Fourth Outline Level</a:t>
             </a:r>
             <a:endParaRPr/>
           </a:p>
@@ -1314,7 +1479,7 @@
               <a:rPr lang="pt-BR" sz="2000">
                 <a:latin typeface="Arial"/>
               </a:rPr>
-              <a:t>5.º Nível da estrutura de tópicos</a:t>
+              <a:t>Fifth Outline Level</a:t>
             </a:r>
             <a:endParaRPr/>
           </a:p>
@@ -1328,7 +1493,7 @@
               <a:rPr lang="pt-BR" sz="2000">
                 <a:latin typeface="Arial"/>
               </a:rPr>
-              <a:t>6.º Nível da estrutura de tópicos</a:t>
+              <a:t>Sixth Outline Level</a:t>
             </a:r>
             <a:endParaRPr/>
           </a:p>
@@ -1342,7 +1507,7 @@
               <a:rPr lang="pt-BR" sz="2000">
                 <a:latin typeface="Arial"/>
               </a:rPr>
-              <a:t>7.º Nível da estrutura de tópicos</a:t>
+              <a:t>Seventh Outline Level</a:t>
             </a:r>
             <a:endParaRPr/>
           </a:p>
@@ -1350,26 +1515,306 @@
       </p:sp>
     </p:spTree>
   </p:cSld>
-  <p:clrMap bg1="lt1" bg2="lt2" tx1="dk1" tx2="dk2" accent1="accent1" accent2="accent2" accent3="accent3" accent4="accent4" accent5="accent5" accent6="accent6" hlink="hlink" folHlink="folHlink"/>
+  <p:clrMap bg1="lt1" tx1="dk1" bg2="lt2" tx2="dk2" accent1="accent1" accent2="accent2" accent3="accent3" accent4="accent4" accent5="accent5" accent6="accent6" hlink="hlink" folHlink="folHlink"/>
   <p:sldLayoutIdLst>
-    <p:sldLayoutId id="2147483649" r:id="rId2"/>
-    <p:sldLayoutId id="2147483650" r:id="rId3"/>
-    <p:sldLayoutId id="2147483651" r:id="rId4"/>
-    <p:sldLayoutId id="2147483652" r:id="rId5"/>
-    <p:sldLayoutId id="2147483653" r:id="rId6"/>
-    <p:sldLayoutId id="2147483654" r:id="rId7"/>
-    <p:sldLayoutId id="2147483655" r:id="rId8"/>
-    <p:sldLayoutId id="2147483656" r:id="rId9"/>
-    <p:sldLayoutId id="2147483657" r:id="rId10"/>
-    <p:sldLayoutId id="2147483658" r:id="rId11"/>
-    <p:sldLayoutId id="2147483659" r:id="rId12"/>
-    <p:sldLayoutId id="2147483660" r:id="rId13"/>
+    <p:sldLayoutId id="2147483649" r:id="rId1"/>
+    <p:sldLayoutId id="2147483650" r:id="rId2"/>
+    <p:sldLayoutId id="2147483651" r:id="rId3"/>
+    <p:sldLayoutId id="2147483652" r:id="rId4"/>
+    <p:sldLayoutId id="2147483653" r:id="rId5"/>
+    <p:sldLayoutId id="2147483654" r:id="rId6"/>
+    <p:sldLayoutId id="2147483655" r:id="rId7"/>
+    <p:sldLayoutId id="2147483656" r:id="rId8"/>
+    <p:sldLayoutId id="2147483657" r:id="rId9"/>
+    <p:sldLayoutId id="2147483658" r:id="rId10"/>
+    <p:sldLayoutId id="2147483659" r:id="rId11"/>
+    <p:sldLayoutId id="2147483660" r:id="rId12"/>
   </p:sldLayoutIdLst>
+  <p:txStyles>
+    <p:titleStyle>
+      <a:lvl1pPr algn="l" defTabSz="914400" rtl="0" eaLnBrk="1" latinLnBrk="0" hangingPunct="1">
+        <a:lnSpc>
+          <a:spcPct val="90000"/>
+        </a:lnSpc>
+        <a:spcBef>
+          <a:spcPct val="0"/>
+        </a:spcBef>
+        <a:buNone/>
+        <a:defRPr sz="4400" kern="1200">
+          <a:solidFill>
+            <a:schemeClr val="tx1"/>
+          </a:solidFill>
+          <a:latin typeface="+mj-lt"/>
+          <a:ea typeface="+mj-ea"/>
+          <a:cs typeface="+mj-cs"/>
+        </a:defRPr>
+      </a:lvl1pPr>
+    </p:titleStyle>
+    <p:bodyStyle>
+      <a:lvl1pPr marL="228600" indent="-228600" algn="l" defTabSz="914400" rtl="0" eaLnBrk="1" latinLnBrk="0" hangingPunct="1">
+        <a:lnSpc>
+          <a:spcPct val="90000"/>
+        </a:lnSpc>
+        <a:spcBef>
+          <a:spcPts val="1000"/>
+        </a:spcBef>
+        <a:buFont typeface="Arial" panose="020B0604020202020204" pitchFamily="34" charset="0"/>
+        <a:buChar char="•"/>
+        <a:defRPr sz="2800" kern="1200">
+          <a:solidFill>
+            <a:schemeClr val="tx1"/>
+          </a:solidFill>
+          <a:latin typeface="+mn-lt"/>
+          <a:ea typeface="+mn-ea"/>
+          <a:cs typeface="+mn-cs"/>
+        </a:defRPr>
+      </a:lvl1pPr>
+      <a:lvl2pPr marL="685800" indent="-228600" algn="l" defTabSz="914400" rtl="0" eaLnBrk="1" latinLnBrk="0" hangingPunct="1">
+        <a:lnSpc>
+          <a:spcPct val="90000"/>
+        </a:lnSpc>
+        <a:spcBef>
+          <a:spcPts val="500"/>
+        </a:spcBef>
+        <a:buFont typeface="Arial" panose="020B0604020202020204" pitchFamily="34" charset="0"/>
+        <a:buChar char="•"/>
+        <a:defRPr sz="2400" kern="1200">
+          <a:solidFill>
+            <a:schemeClr val="tx1"/>
+          </a:solidFill>
+          <a:latin typeface="+mn-lt"/>
+          <a:ea typeface="+mn-ea"/>
+          <a:cs typeface="+mn-cs"/>
+        </a:defRPr>
+      </a:lvl2pPr>
+      <a:lvl3pPr marL="1143000" indent="-228600" algn="l" defTabSz="914400" rtl="0" eaLnBrk="1" latinLnBrk="0" hangingPunct="1">
+        <a:lnSpc>
+          <a:spcPct val="90000"/>
+        </a:lnSpc>
+        <a:spcBef>
+          <a:spcPts val="500"/>
+        </a:spcBef>
+        <a:buFont typeface="Arial" panose="020B0604020202020204" pitchFamily="34" charset="0"/>
+        <a:buChar char="•"/>
+        <a:defRPr sz="2000" kern="1200">
+          <a:solidFill>
+            <a:schemeClr val="tx1"/>
+          </a:solidFill>
+          <a:latin typeface="+mn-lt"/>
+          <a:ea typeface="+mn-ea"/>
+          <a:cs typeface="+mn-cs"/>
+        </a:defRPr>
+      </a:lvl3pPr>
+      <a:lvl4pPr marL="1600200" indent="-228600" algn="l" defTabSz="914400" rtl="0" eaLnBrk="1" latinLnBrk="0" hangingPunct="1">
+        <a:lnSpc>
+          <a:spcPct val="90000"/>
+        </a:lnSpc>
+        <a:spcBef>
+          <a:spcPts val="500"/>
+        </a:spcBef>
+        <a:buFont typeface="Arial" panose="020B0604020202020204" pitchFamily="34" charset="0"/>
+        <a:buChar char="•"/>
+        <a:defRPr sz="1800" kern="1200">
+          <a:solidFill>
+            <a:schemeClr val="tx1"/>
+          </a:solidFill>
+          <a:latin typeface="+mn-lt"/>
+          <a:ea typeface="+mn-ea"/>
+          <a:cs typeface="+mn-cs"/>
+        </a:defRPr>
+      </a:lvl4pPr>
+      <a:lvl5pPr marL="2057400" indent="-228600" algn="l" defTabSz="914400" rtl="0" eaLnBrk="1" latinLnBrk="0" hangingPunct="1">
+        <a:lnSpc>
+          <a:spcPct val="90000"/>
+        </a:lnSpc>
+        <a:spcBef>
+          <a:spcPts val="500"/>
+        </a:spcBef>
+        <a:buFont typeface="Arial" panose="020B0604020202020204" pitchFamily="34" charset="0"/>
+        <a:buChar char="•"/>
+        <a:defRPr sz="1800" kern="1200">
+          <a:solidFill>
+            <a:schemeClr val="tx1"/>
+          </a:solidFill>
+          <a:latin typeface="+mn-lt"/>
+          <a:ea typeface="+mn-ea"/>
+          <a:cs typeface="+mn-cs"/>
+        </a:defRPr>
+      </a:lvl5pPr>
+      <a:lvl6pPr marL="2514600" indent="-228600" algn="l" defTabSz="914400" rtl="0" eaLnBrk="1" latinLnBrk="0" hangingPunct="1">
+        <a:lnSpc>
+          <a:spcPct val="90000"/>
+        </a:lnSpc>
+        <a:spcBef>
+          <a:spcPts val="500"/>
+        </a:spcBef>
+        <a:buFont typeface="Arial" panose="020B0604020202020204" pitchFamily="34" charset="0"/>
+        <a:buChar char="•"/>
+        <a:defRPr sz="1800" kern="1200">
+          <a:solidFill>
+            <a:schemeClr val="tx1"/>
+          </a:solidFill>
+          <a:latin typeface="+mn-lt"/>
+          <a:ea typeface="+mn-ea"/>
+          <a:cs typeface="+mn-cs"/>
+        </a:defRPr>
+      </a:lvl6pPr>
+      <a:lvl7pPr marL="2971800" indent="-228600" algn="l" defTabSz="914400" rtl="0" eaLnBrk="1" latinLnBrk="0" hangingPunct="1">
+        <a:lnSpc>
+          <a:spcPct val="90000"/>
+        </a:lnSpc>
+        <a:spcBef>
+          <a:spcPts val="500"/>
+        </a:spcBef>
+        <a:buFont typeface="Arial" panose="020B0604020202020204" pitchFamily="34" charset="0"/>
+        <a:buChar char="•"/>
+        <a:defRPr sz="1800" kern="1200">
+          <a:solidFill>
+            <a:schemeClr val="tx1"/>
+          </a:solidFill>
+          <a:latin typeface="+mn-lt"/>
+          <a:ea typeface="+mn-ea"/>
+          <a:cs typeface="+mn-cs"/>
+        </a:defRPr>
+      </a:lvl7pPr>
+      <a:lvl8pPr marL="3429000" indent="-228600" algn="l" defTabSz="914400" rtl="0" eaLnBrk="1" latinLnBrk="0" hangingPunct="1">
+        <a:lnSpc>
+          <a:spcPct val="90000"/>
+        </a:lnSpc>
+        <a:spcBef>
+          <a:spcPts val="500"/>
+        </a:spcBef>
+        <a:buFont typeface="Arial" panose="020B0604020202020204" pitchFamily="34" charset="0"/>
+        <a:buChar char="•"/>
+        <a:defRPr sz="1800" kern="1200">
+          <a:solidFill>
+            <a:schemeClr val="tx1"/>
+          </a:solidFill>
+          <a:latin typeface="+mn-lt"/>
+          <a:ea typeface="+mn-ea"/>
+          <a:cs typeface="+mn-cs"/>
+        </a:defRPr>
+      </a:lvl8pPr>
+      <a:lvl9pPr marL="3886200" indent="-228600" algn="l" defTabSz="914400" rtl="0" eaLnBrk="1" latinLnBrk="0" hangingPunct="1">
+        <a:lnSpc>
+          <a:spcPct val="90000"/>
+        </a:lnSpc>
+        <a:spcBef>
+          <a:spcPts val="500"/>
+        </a:spcBef>
+        <a:buFont typeface="Arial" panose="020B0604020202020204" pitchFamily="34" charset="0"/>
+        <a:buChar char="•"/>
+        <a:defRPr sz="1800" kern="1200">
+          <a:solidFill>
+            <a:schemeClr val="tx1"/>
+          </a:solidFill>
+          <a:latin typeface="+mn-lt"/>
+          <a:ea typeface="+mn-ea"/>
+          <a:cs typeface="+mn-cs"/>
+        </a:defRPr>
+      </a:lvl9pPr>
+    </p:bodyStyle>
+    <p:otherStyle>
+      <a:defPPr>
+        <a:defRPr lang="pt-BR"/>
+      </a:defPPr>
+      <a:lvl1pPr marL="0" algn="l" defTabSz="914400" rtl="0" eaLnBrk="1" latinLnBrk="0" hangingPunct="1">
+        <a:defRPr sz="1800" kern="1200">
+          <a:solidFill>
+            <a:schemeClr val="tx1"/>
+          </a:solidFill>
+          <a:latin typeface="+mn-lt"/>
+          <a:ea typeface="+mn-ea"/>
+          <a:cs typeface="+mn-cs"/>
+        </a:defRPr>
+      </a:lvl1pPr>
+      <a:lvl2pPr marL="457200" algn="l" defTabSz="914400" rtl="0" eaLnBrk="1" latinLnBrk="0" hangingPunct="1">
+        <a:defRPr sz="1800" kern="1200">
+          <a:solidFill>
+            <a:schemeClr val="tx1"/>
+          </a:solidFill>
+          <a:latin typeface="+mn-lt"/>
+          <a:ea typeface="+mn-ea"/>
+          <a:cs typeface="+mn-cs"/>
+        </a:defRPr>
+      </a:lvl2pPr>
+      <a:lvl3pPr marL="914400" algn="l" defTabSz="914400" rtl="0" eaLnBrk="1" latinLnBrk="0" hangingPunct="1">
+        <a:defRPr sz="1800" kern="1200">
+          <a:solidFill>
+            <a:schemeClr val="tx1"/>
+          </a:solidFill>
+          <a:latin typeface="+mn-lt"/>
+          <a:ea typeface="+mn-ea"/>
+          <a:cs typeface="+mn-cs"/>
+        </a:defRPr>
+      </a:lvl3pPr>
+      <a:lvl4pPr marL="1371600" algn="l" defTabSz="914400" rtl="0" eaLnBrk="1" latinLnBrk="0" hangingPunct="1">
+        <a:defRPr sz="1800" kern="1200">
+          <a:solidFill>
+            <a:schemeClr val="tx1"/>
+          </a:solidFill>
+          <a:latin typeface="+mn-lt"/>
+          <a:ea typeface="+mn-ea"/>
+          <a:cs typeface="+mn-cs"/>
+        </a:defRPr>
+      </a:lvl4pPr>
+      <a:lvl5pPr marL="1828800" algn="l" defTabSz="914400" rtl="0" eaLnBrk="1" latinLnBrk="0" hangingPunct="1">
+        <a:defRPr sz="1800" kern="1200">
+          <a:solidFill>
+            <a:schemeClr val="tx1"/>
+          </a:solidFill>
+          <a:latin typeface="+mn-lt"/>
+          <a:ea typeface="+mn-ea"/>
+          <a:cs typeface="+mn-cs"/>
+        </a:defRPr>
+      </a:lvl5pPr>
+      <a:lvl6pPr marL="2286000" algn="l" defTabSz="914400" rtl="0" eaLnBrk="1" latinLnBrk="0" hangingPunct="1">
+        <a:defRPr sz="1800" kern="1200">
+          <a:solidFill>
+            <a:schemeClr val="tx1"/>
+          </a:solidFill>
+          <a:latin typeface="+mn-lt"/>
+          <a:ea typeface="+mn-ea"/>
+          <a:cs typeface="+mn-cs"/>
+        </a:defRPr>
+      </a:lvl6pPr>
+      <a:lvl7pPr marL="2743200" algn="l" defTabSz="914400" rtl="0" eaLnBrk="1" latinLnBrk="0" hangingPunct="1">
+        <a:defRPr sz="1800" kern="1200">
+          <a:solidFill>
+            <a:schemeClr val="tx1"/>
+          </a:solidFill>
+          <a:latin typeface="+mn-lt"/>
+          <a:ea typeface="+mn-ea"/>
+          <a:cs typeface="+mn-cs"/>
+        </a:defRPr>
+      </a:lvl7pPr>
+      <a:lvl8pPr marL="3200400" algn="l" defTabSz="914400" rtl="0" eaLnBrk="1" latinLnBrk="0" hangingPunct="1">
+        <a:defRPr sz="1800" kern="1200">
+          <a:solidFill>
+            <a:schemeClr val="tx1"/>
+          </a:solidFill>
+          <a:latin typeface="+mn-lt"/>
+          <a:ea typeface="+mn-ea"/>
+          <a:cs typeface="+mn-cs"/>
+        </a:defRPr>
+      </a:lvl8pPr>
+      <a:lvl9pPr marL="3657600" algn="l" defTabSz="914400" rtl="0" eaLnBrk="1" latinLnBrk="0" hangingPunct="1">
+        <a:defRPr sz="1800" kern="1200">
+          <a:solidFill>
+            <a:schemeClr val="tx1"/>
+          </a:solidFill>
+          <a:latin typeface="+mn-lt"/>
+          <a:ea typeface="+mn-ea"/>
+          <a:cs typeface="+mn-cs"/>
+        </a:defRPr>
+      </a:lvl9pPr>
+    </p:otherStyle>
+  </p:txStyles>
 </p:sldMaster>
 </file>
 
 <file path=ppt/slides/slide1.xml><?xml version="1.0" encoding="utf-8"?>
-<p:sld xmlns:a="http://schemas.openxmlformats.org/drawingml/2006/main" xmlns:p="http://schemas.openxmlformats.org/presentationml/2006/main" xmlns:r="http://schemas.openxmlformats.org/officeDocument/2006/relationships">
+<p:sld xmlns:a="http://schemas.openxmlformats.org/drawingml/2006/main" xmlns:r="http://schemas.openxmlformats.org/officeDocument/2006/relationships" xmlns:p="http://schemas.openxmlformats.org/presentationml/2006/main">
   <p:cSld>
     <p:spTree>
       <p:nvGrpSpPr>
@@ -1387,296 +1832,476 @@
       </p:grpSpPr>
       <p:pic>
         <p:nvPicPr>
-          <p:cNvPr id="36" name="Picture 2" descr=""/>
-          <p:cNvPicPr/>
+          <p:cNvPr id="9" name="Imagem 8"/>
+          <p:cNvPicPr>
+            <a:picLocks noChangeAspect="1"/>
+          </p:cNvPicPr>
           <p:nvPr/>
         </p:nvPicPr>
         <p:blipFill>
-          <a:blip r:embed="rId1"/>
+          <a:blip r:embed="rId2" cstate="print">
+            <a:extLst>
+              <a:ext uri="{28A0092B-C50C-407E-A947-70E740481C1C}">
+                <a14:useLocalDpi xmlns:a14="http://schemas.microsoft.com/office/drawing/2010/main" val="0"/>
+              </a:ext>
+            </a:extLst>
+          </a:blip>
           <a:stretch>
             <a:fillRect/>
           </a:stretch>
         </p:blipFill>
         <p:spPr>
           <a:xfrm>
-            <a:off x="720" y="-27360"/>
-            <a:ext cx="9142560" cy="6883920"/>
-          </a:xfrm>
-          <a:prstGeom prst="rect">
-            <a:avLst/>
-          </a:prstGeom>
-          <a:ln>
-            <a:noFill/>
-          </a:ln>
+            <a:off x="-720" y="0"/>
+            <a:ext cx="9144720" cy="6858000"/>
+          </a:xfrm>
+          <a:prstGeom prst="rect">
+            <a:avLst/>
+          </a:prstGeom>
         </p:spPr>
       </p:pic>
+      <p:sp>
+        <p:nvSpPr>
+          <p:cNvPr id="3" name="CaixaDeTexto 2"/>
+          <p:cNvSpPr txBox="1"/>
+          <p:nvPr/>
+        </p:nvSpPr>
+        <p:spPr>
+          <a:xfrm>
+            <a:off x="0" y="2429568"/>
+            <a:ext cx="9144000" cy="338554"/>
+          </a:xfrm>
+          <a:prstGeom prst="rect">
+            <a:avLst/>
+          </a:prstGeom>
+          <a:noFill/>
+        </p:spPr>
+        <p:txBody>
+          <a:bodyPr wrap="square" rtlCol="0">
+            <a:spAutoFit/>
+          </a:bodyPr>
+          <a:lstStyle/>
+          <a:p>
+            <a:pPr algn="ctr"/>
+            <a:r>
+              <a:rPr lang="pt-BR" sz="1600" dirty="0" smtClean="0">
+                <a:latin typeface="HelveticaNeue LT 45 Light" panose="020B0404020002020204" pitchFamily="34" charset="0"/>
+              </a:rPr>
+              <a:t>Certificamos que,</a:t>
+            </a:r>
+            <a:endParaRPr lang="pt-BR" sz="1600" dirty="0">
+              <a:latin typeface="HelveticaNeue LT 45 Light" panose="020B0404020002020204" pitchFamily="34" charset="0"/>
+            </a:endParaRPr>
+          </a:p>
+        </p:txBody>
+      </p:sp>
+      <p:sp>
+        <p:nvSpPr>
+          <p:cNvPr id="19" name="CaixaDeTexto 18"/>
+          <p:cNvSpPr txBox="1"/>
+          <p:nvPr/>
+        </p:nvSpPr>
+        <p:spPr>
+          <a:xfrm>
+            <a:off x="0" y="3258667"/>
+            <a:ext cx="9144000" cy="584775"/>
+          </a:xfrm>
+          <a:prstGeom prst="rect">
+            <a:avLst/>
+          </a:prstGeom>
+          <a:noFill/>
+        </p:spPr>
+        <p:txBody>
+          <a:bodyPr wrap="square" rtlCol="0">
+            <a:spAutoFit/>
+          </a:bodyPr>
+          <a:lstStyle/>
+          <a:p>
+            <a:pPr algn="ctr"/>
+            <a:r>
+              <a:rPr lang="pt-BR" sz="1600" dirty="0" smtClean="0">
+                <a:latin typeface="HelveticaNeue LT 45 Light" panose="020B0404020002020204" pitchFamily="34" charset="0"/>
+              </a:rPr>
+              <a:t>participou do </a:t>
+            </a:r>
+            <a:r>
+              <a:rPr lang="pt-BR" sz="1600" i="1" dirty="0" smtClean="0">
+                <a:latin typeface="HelveticaNeue LT 65 Medium" panose="02000603020000020004" pitchFamily="2" charset="0"/>
+              </a:rPr>
+              <a:t>Processo de Elaboração de Certificados do SEVEN</a:t>
+            </a:r>
+            <a:r>
+              <a:rPr lang="pt-BR" sz="1600" dirty="0" smtClean="0">
+                <a:latin typeface="HelveticaNeue LT 45 Light" panose="020B0404020002020204" pitchFamily="34" charset="0"/>
+              </a:rPr>
+              <a:t>, promovido </a:t>
+            </a:r>
+          </a:p>
+          <a:p>
+            <a:pPr algn="ctr"/>
+            <a:r>
+              <a:rPr lang="pt-BR" sz="1600" dirty="0" smtClean="0">
+                <a:latin typeface="HelveticaNeue LT 45 Light" panose="020B0404020002020204" pitchFamily="34" charset="0"/>
+              </a:rPr>
+              <a:t>pela Universidade Federal do Ceará Campus em Quixadá, na atividade:</a:t>
+            </a:r>
+            <a:endParaRPr lang="pt-BR" sz="1600" dirty="0">
+              <a:latin typeface="HelveticaNeue LT 45 Light" panose="020B0404020002020204" pitchFamily="34" charset="0"/>
+            </a:endParaRPr>
+          </a:p>
+        </p:txBody>
+      </p:sp>
+      <p:sp>
+        <p:nvSpPr>
+          <p:cNvPr id="20" name="CaixaDeTexto 19"/>
+          <p:cNvSpPr txBox="1"/>
+          <p:nvPr/>
+        </p:nvSpPr>
+        <p:spPr>
+          <a:xfrm>
+            <a:off x="0" y="4222508"/>
+            <a:ext cx="9144000" cy="338554"/>
+          </a:xfrm>
+          <a:prstGeom prst="rect">
+            <a:avLst/>
+          </a:prstGeom>
+          <a:noFill/>
+        </p:spPr>
+        <p:txBody>
+          <a:bodyPr wrap="square" rtlCol="0">
+            <a:spAutoFit/>
+          </a:bodyPr>
+          <a:lstStyle/>
+          <a:p>
+            <a:pPr algn="ctr"/>
+            <a:r>
+              <a:rPr lang="pt-BR" sz="1600" dirty="0" smtClean="0">
+                <a:latin typeface="HelveticaNeue LT 45 Light" panose="020B0404020002020204" pitchFamily="34" charset="0"/>
+              </a:rPr>
+              <a:t>realizado no dia </a:t>
+            </a:r>
+            <a:r>
+              <a:rPr lang="pt-BR" sz="1600" i="1" dirty="0" smtClean="0">
+                <a:latin typeface="HelveticaNeue LT 65 Medium" panose="02000603020000020004" pitchFamily="2" charset="0"/>
+              </a:rPr>
+              <a:t>30</a:t>
+            </a:r>
+            <a:r>
+              <a:rPr lang="pt-BR" sz="1600" dirty="0" smtClean="0">
+                <a:latin typeface="HelveticaNeue LT 45 Light" panose="020B0404020002020204" pitchFamily="34" charset="0"/>
+              </a:rPr>
+              <a:t> de </a:t>
+            </a:r>
+            <a:r>
+              <a:rPr lang="pt-BR" sz="1600" i="1" dirty="0" smtClean="0">
+                <a:latin typeface="HelveticaNeue LT 65 Medium" panose="02000603020000020004" pitchFamily="2" charset="0"/>
+              </a:rPr>
+              <a:t>julho</a:t>
+            </a:r>
+            <a:r>
+              <a:rPr lang="pt-BR" sz="1600" dirty="0" smtClean="0">
+                <a:latin typeface="HelveticaNeue LT 45 Light" panose="020B0404020002020204" pitchFamily="34" charset="0"/>
+              </a:rPr>
+              <a:t> de </a:t>
+            </a:r>
+            <a:r>
+              <a:rPr lang="pt-BR" sz="1600" i="1" dirty="0" smtClean="0">
+                <a:latin typeface="HelveticaNeue LT 65 Medium" panose="02000603020000020004" pitchFamily="2" charset="0"/>
+              </a:rPr>
+              <a:t>2015</a:t>
+            </a:r>
+            <a:r>
+              <a:rPr lang="pt-BR" sz="1600" dirty="0" smtClean="0">
+                <a:latin typeface="HelveticaNeue LT 45 Light" panose="020B0404020002020204" pitchFamily="34" charset="0"/>
+              </a:rPr>
+              <a:t>.</a:t>
+            </a:r>
+            <a:endParaRPr lang="pt-BR" sz="1600" dirty="0">
+              <a:latin typeface="HelveticaNeue LT 45 Light" panose="020B0404020002020204" pitchFamily="34" charset="0"/>
+            </a:endParaRPr>
+          </a:p>
+        </p:txBody>
+      </p:sp>
+      <p:sp>
+        <p:nvSpPr>
+          <p:cNvPr id="21" name="CaixaDeTexto 20"/>
+          <p:cNvSpPr txBox="1"/>
+          <p:nvPr/>
+        </p:nvSpPr>
+        <p:spPr>
+          <a:xfrm>
+            <a:off x="0" y="5432741"/>
+            <a:ext cx="9144000" cy="369332"/>
+          </a:xfrm>
+          <a:prstGeom prst="rect">
+            <a:avLst/>
+          </a:prstGeom>
+          <a:noFill/>
+        </p:spPr>
+        <p:txBody>
+          <a:bodyPr wrap="square" rtlCol="0">
+            <a:spAutoFit/>
+          </a:bodyPr>
+          <a:lstStyle/>
+          <a:p>
+            <a:pPr algn="ctr"/>
+            <a:r>
+              <a:rPr lang="pt-BR" sz="1000" dirty="0" smtClean="0">
+                <a:latin typeface="HelveticaNeue LT 45 Light" panose="020B0404020002020204" pitchFamily="34" charset="0"/>
+              </a:rPr>
+              <a:t>Prof. Certificado Teste</a:t>
+            </a:r>
+          </a:p>
+          <a:p>
+            <a:pPr algn="ctr"/>
+            <a:r>
+              <a:rPr lang="pt-BR" sz="800" i="1" dirty="0" smtClean="0">
+                <a:latin typeface="HelveticaNeue LT 45 Light" panose="020B0404020002020204" pitchFamily="34" charset="0"/>
+              </a:rPr>
+              <a:t>Coordenador do PET </a:t>
+            </a:r>
+            <a:r>
+              <a:rPr lang="pt-BR" sz="800" i="1" dirty="0" err="1" smtClean="0">
+                <a:latin typeface="HelveticaNeue LT 45 Light" panose="020B0404020002020204" pitchFamily="34" charset="0"/>
+              </a:rPr>
+              <a:t>Quixada</a:t>
+            </a:r>
+            <a:endParaRPr lang="pt-BR" sz="800" i="1" dirty="0">
+              <a:latin typeface="HelveticaNeue LT 45 Light" panose="020B0404020002020204" pitchFamily="34" charset="0"/>
+            </a:endParaRPr>
+          </a:p>
+        </p:txBody>
+      </p:sp>
+      <p:sp>
+        <p:nvSpPr>
+          <p:cNvPr id="22" name="CaixaDeTexto 21"/>
+          <p:cNvSpPr txBox="1"/>
+          <p:nvPr/>
+        </p:nvSpPr>
+        <p:spPr>
+          <a:xfrm>
+            <a:off x="0" y="1481412"/>
+            <a:ext cx="9144000" cy="800219"/>
+          </a:xfrm>
+          <a:prstGeom prst="rect">
+            <a:avLst/>
+          </a:prstGeom>
+          <a:noFill/>
+        </p:spPr>
+        <p:txBody>
+          <a:bodyPr wrap="square" rtlCol="0">
+            <a:spAutoFit/>
+          </a:bodyPr>
+          <a:lstStyle/>
+          <a:p>
+            <a:pPr algn="ctr"/>
+            <a:r>
+              <a:rPr lang="pt-BR" sz="4600" b="1" i="1" dirty="0" smtClean="0">
+                <a:latin typeface="Helvetica 45 Light" pitchFamily="34" charset="0"/>
+              </a:rPr>
+              <a:t>Certificado</a:t>
+            </a:r>
+            <a:endParaRPr lang="pt-BR" sz="4600" b="1" i="1" dirty="0">
+              <a:latin typeface="Helvetica 45 Light" pitchFamily="34" charset="0"/>
+            </a:endParaRPr>
+          </a:p>
+        </p:txBody>
+      </p:sp>
+      <p:sp>
+        <p:nvSpPr>
+          <p:cNvPr id="23" name="CaixaDeTexto 22"/>
+          <p:cNvSpPr txBox="1"/>
+          <p:nvPr/>
+        </p:nvSpPr>
+        <p:spPr>
+          <a:xfrm>
+            <a:off x="6221096" y="5934043"/>
+            <a:ext cx="1068079" cy="200055"/>
+          </a:xfrm>
+          <a:prstGeom prst="rect">
+            <a:avLst/>
+          </a:prstGeom>
+          <a:noFill/>
+        </p:spPr>
+        <p:txBody>
+          <a:bodyPr wrap="square" rtlCol="0">
+            <a:spAutoFit/>
+          </a:bodyPr>
+          <a:lstStyle/>
+          <a:p>
+            <a:pPr algn="ctr"/>
+            <a:r>
+              <a:rPr lang="pt-BR" sz="700" b="1" dirty="0" smtClean="0">
+                <a:latin typeface="HelveticaNeue LT 65 Medium" panose="02000603020000020004" pitchFamily="2" charset="0"/>
+              </a:rPr>
+              <a:t>Realização:</a:t>
+            </a:r>
+            <a:endParaRPr lang="pt-BR" sz="500" b="1" i="1" dirty="0">
+              <a:latin typeface="HelveticaNeue LT 65 Medium" panose="02000603020000020004" pitchFamily="2" charset="0"/>
+            </a:endParaRPr>
+          </a:p>
+        </p:txBody>
+      </p:sp>
       <p:pic>
         <p:nvPicPr>
-          <p:cNvPr id="37" name="Imagem 8" descr=""/>
-          <p:cNvPicPr/>
+          <p:cNvPr id="4" name="Imagem 3"/>
+          <p:cNvPicPr>
+            <a:picLocks noChangeAspect="1"/>
+          </p:cNvPicPr>
           <p:nvPr/>
         </p:nvPicPr>
         <p:blipFill>
-          <a:blip r:embed="rId2"/>
+          <a:blip r:embed="rId3" cstate="print">
+            <a:extLst>
+              <a:ext uri="{28A0092B-C50C-407E-A947-70E740481C1C}">
+                <a14:useLocalDpi xmlns:a14="http://schemas.microsoft.com/office/drawing/2010/main" val="0"/>
+              </a:ext>
+            </a:extLst>
+          </a:blip>
           <a:stretch>
             <a:fillRect/>
           </a:stretch>
         </p:blipFill>
         <p:spPr>
           <a:xfrm>
-            <a:off x="2533680" y="5445360"/>
-            <a:ext cx="899280" cy="746640"/>
-          </a:xfrm>
-          <a:prstGeom prst="rect">
-            <a:avLst/>
-          </a:prstGeom>
-          <a:ln>
-            <a:noFill/>
-          </a:ln>
+            <a:off x="6459681" y="6128549"/>
+            <a:ext cx="650332" cy="325167"/>
+          </a:xfrm>
+          <a:prstGeom prst="rect">
+            <a:avLst/>
+          </a:prstGeom>
         </p:spPr>
       </p:pic>
       <p:pic>
         <p:nvPicPr>
-          <p:cNvPr id="38" name="Imagem 2" descr=""/>
-          <p:cNvPicPr/>
+          <p:cNvPr id="5" name="Imagem 4"/>
+          <p:cNvPicPr>
+            <a:picLocks noChangeAspect="1"/>
+          </p:cNvPicPr>
           <p:nvPr/>
         </p:nvPicPr>
         <p:blipFill>
-          <a:blip r:embed="rId3"/>
+          <a:blip r:embed="rId4" cstate="print">
+            <a:extLst>
+              <a:ext uri="{28A0092B-C50C-407E-A947-70E740481C1C}">
+                <a14:useLocalDpi xmlns:a14="http://schemas.microsoft.com/office/drawing/2010/main" val="0"/>
+              </a:ext>
+            </a:extLst>
+          </a:blip>
           <a:stretch>
             <a:fillRect/>
           </a:stretch>
         </p:blipFill>
         <p:spPr>
           <a:xfrm>
-            <a:off x="683640" y="5445360"/>
-            <a:ext cx="1438560" cy="818640"/>
-          </a:xfrm>
-          <a:prstGeom prst="rect">
-            <a:avLst/>
-          </a:prstGeom>
-          <a:ln>
-            <a:noFill/>
-          </a:ln>
+            <a:off x="7158071" y="6116825"/>
+            <a:ext cx="812916" cy="325167"/>
+          </a:xfrm>
+          <a:prstGeom prst="rect">
+            <a:avLst/>
+          </a:prstGeom>
         </p:spPr>
       </p:pic>
-      <p:sp>
-        <p:nvSpPr>
-          <p:cNvPr id="39" name="CustomShape 1"/>
-          <p:cNvSpPr/>
-          <p:nvPr/>
-        </p:nvSpPr>
-        <p:spPr>
-          <a:xfrm>
-            <a:off x="539640" y="5148000"/>
-            <a:ext cx="1848960" cy="911520"/>
-          </a:xfrm>
-          <a:prstGeom prst="rect">
-            <a:avLst/>
-          </a:prstGeom>
-          <a:noFill/>
-          <a:ln>
-            <a:noFill/>
-          </a:ln>
-        </p:spPr>
-        <p:txBody>
-          <a:bodyPr lIns="90000" rIns="90000" tIns="45000" bIns="45000"/>
-          <a:p>
-            <a:pPr>
-              <a:lnSpc>
-                <a:spcPct val="100000"/>
-              </a:lnSpc>
-            </a:pPr>
-            <a:r>
-              <a:rPr b="1" lang="pt-BR">
-                <a:solidFill>
-                  <a:srgbClr val="000000"/>
-                </a:solidFill>
-                <a:latin typeface="Calibri"/>
-              </a:rPr>
-              <a:t>Organização                        </a:t>
-            </a:r>
-            <a:endParaRPr/>
-          </a:p>
-        </p:txBody>
-      </p:sp>
-      <p:sp>
-        <p:nvSpPr>
-          <p:cNvPr id="40" name="CustomShape 2"/>
-          <p:cNvSpPr/>
-          <p:nvPr/>
-        </p:nvSpPr>
-        <p:spPr>
-          <a:xfrm>
-            <a:off x="2411640" y="5148000"/>
-            <a:ext cx="1619280" cy="637200"/>
-          </a:xfrm>
-          <a:prstGeom prst="rect">
-            <a:avLst/>
-          </a:prstGeom>
-          <a:noFill/>
-          <a:ln>
-            <a:noFill/>
-          </a:ln>
-        </p:spPr>
-        <p:txBody>
-          <a:bodyPr lIns="90000" rIns="90000" tIns="45000" bIns="45000"/>
-          <a:p>
-            <a:pPr>
-              <a:lnSpc>
-                <a:spcPct val="100000"/>
-              </a:lnSpc>
-            </a:pPr>
-            <a:r>
-              <a:rPr b="1" lang="pt-BR">
-                <a:solidFill>
-                  <a:srgbClr val="000000"/>
-                </a:solidFill>
-                <a:latin typeface="Calibri"/>
-              </a:rPr>
-              <a:t>Realização</a:t>
-            </a:r>
-            <a:endParaRPr/>
-          </a:p>
-        </p:txBody>
-      </p:sp>
       <p:pic>
         <p:nvPicPr>
-          <p:cNvPr id="41" name="Picture 2" descr=""/>
-          <p:cNvPicPr/>
+          <p:cNvPr id="6" name="Imagem 5"/>
+          <p:cNvPicPr>
+            <a:picLocks noChangeAspect="1"/>
+          </p:cNvPicPr>
           <p:nvPr/>
         </p:nvPicPr>
         <p:blipFill>
-          <a:blip r:embed="rId4"/>
+          <a:blip r:embed="rId5" cstate="print">
+            <a:extLst>
+              <a:ext uri="{28A0092B-C50C-407E-A947-70E740481C1C}">
+                <a14:useLocalDpi xmlns:a14="http://schemas.microsoft.com/office/drawing/2010/main" val="0"/>
+              </a:ext>
+            </a:extLst>
+          </a:blip>
           <a:stretch>
             <a:fillRect/>
           </a:stretch>
         </p:blipFill>
         <p:spPr>
           <a:xfrm>
-            <a:off x="722520" y="254880"/>
-            <a:ext cx="7668000" cy="1385640"/>
-          </a:xfrm>
-          <a:prstGeom prst="rect">
-            <a:avLst/>
-          </a:prstGeom>
-          <a:ln>
-            <a:noFill/>
-          </a:ln>
+            <a:off x="7997685" y="6106072"/>
+            <a:ext cx="716469" cy="325167"/>
+          </a:xfrm>
+          <a:prstGeom prst="rect">
+            <a:avLst/>
+          </a:prstGeom>
         </p:spPr>
       </p:pic>
-      <p:sp>
-        <p:nvSpPr>
-          <p:cNvPr id="42" name="Line 3"/>
+      <p:pic>
+        <p:nvPicPr>
+          <p:cNvPr id="7" name="Imagem 6"/>
+          <p:cNvPicPr>
+            <a:picLocks noChangeAspect="1"/>
+          </p:cNvPicPr>
+          <p:nvPr/>
+        </p:nvPicPr>
+        <p:blipFill>
+          <a:blip r:embed="rId6" cstate="print">
+            <a:extLst>
+              <a:ext uri="{28A0092B-C50C-407E-A947-70E740481C1C}">
+                <a14:useLocalDpi xmlns:a14="http://schemas.microsoft.com/office/drawing/2010/main" val="0"/>
+              </a:ext>
+            </a:extLst>
+          </a:blip>
+          <a:stretch>
+            <a:fillRect/>
+          </a:stretch>
+        </p:blipFill>
+        <p:spPr>
+          <a:xfrm>
+            <a:off x="398180" y="363906"/>
+            <a:ext cx="2946805" cy="1061184"/>
+          </a:xfrm>
+          <a:prstGeom prst="rect">
+            <a:avLst/>
+          </a:prstGeom>
+        </p:spPr>
+      </p:pic>
+      <p:pic>
+        <p:nvPicPr>
+          <p:cNvPr id="8" name="Imagem 7"/>
+          <p:cNvPicPr>
+            <a:picLocks noChangeAspect="1"/>
+          </p:cNvPicPr>
+          <p:nvPr/>
+        </p:nvPicPr>
+        <p:blipFill>
+          <a:blip r:embed="rId7" cstate="print">
+            <a:extLst>
+              <a:ext uri="{28A0092B-C50C-407E-A947-70E740481C1C}">
+                <a14:useLocalDpi xmlns:a14="http://schemas.microsoft.com/office/drawing/2010/main" val="0"/>
+              </a:ext>
+            </a:extLst>
+          </a:blip>
+          <a:stretch>
+            <a:fillRect/>
+          </a:stretch>
+        </p:blipFill>
+        <p:spPr>
+          <a:xfrm>
+            <a:off x="3866897" y="5269252"/>
+            <a:ext cx="1511811" cy="359665"/>
+          </a:xfrm>
+          <a:prstGeom prst="rect">
+            <a:avLst/>
+          </a:prstGeom>
+        </p:spPr>
+      </p:pic>
+      <p:sp>
+        <p:nvSpPr>
+          <p:cNvPr id="29" name="CustomShape 6"/>
           <p:cNvSpPr/>
           <p:nvPr/>
         </p:nvSpPr>
         <p:spPr>
           <a:xfrm>
-            <a:off x="4679640" y="5688000"/>
-            <a:ext cx="3240360" cy="0"/>
-          </a:xfrm>
-          <a:prstGeom prst="line">
-            <a:avLst/>
-          </a:prstGeom>
-          <a:ln w="9360">
-            <a:solidFill>
-              <a:srgbClr val="000000"/>
-            </a:solidFill>
-            <a:round/>
-          </a:ln>
-        </p:spPr>
-      </p:sp>
-      <p:sp>
-        <p:nvSpPr>
-          <p:cNvPr id="43" name="CustomShape 4"/>
-          <p:cNvSpPr/>
-          <p:nvPr/>
-        </p:nvSpPr>
-        <p:spPr>
-          <a:xfrm>
-            <a:off x="683640" y="1628640"/>
-            <a:ext cx="7670880" cy="759600"/>
-          </a:xfrm>
-          <a:prstGeom prst="rect">
-            <a:avLst/>
-          </a:prstGeom>
-          <a:noFill/>
-          <a:ln>
-            <a:noFill/>
-          </a:ln>
-        </p:spPr>
-        <p:txBody>
-          <a:bodyPr lIns="90000" rIns="90000" tIns="45000" bIns="45000"/>
-          <a:p>
-            <a:pPr algn="ctr">
-              <a:lnSpc>
-                <a:spcPct val="100000"/>
-              </a:lnSpc>
-            </a:pPr>
-            <a:r>
-              <a:rPr lang="pt-BR" sz="4400">
-                <a:solidFill>
-                  <a:srgbClr val="1f497d"/>
-                </a:solidFill>
-                <a:latin typeface="Arno Pro Smbd Caption"/>
-              </a:rPr>
-              <a:t>CERTIFICADO</a:t>
-            </a:r>
-            <a:endParaRPr/>
-          </a:p>
-        </p:txBody>
-      </p:sp>
-      <p:sp>
-        <p:nvSpPr>
-          <p:cNvPr id="44" name="CustomShape 5"/>
-          <p:cNvSpPr/>
-          <p:nvPr/>
-        </p:nvSpPr>
-        <p:spPr>
-          <a:xfrm>
-            <a:off x="5148000" y="5661360"/>
-            <a:ext cx="2734920" cy="394200"/>
-          </a:xfrm>
-          <a:prstGeom prst="rect">
-            <a:avLst/>
-          </a:prstGeom>
-          <a:noFill/>
-          <a:ln>
-            <a:noFill/>
-          </a:ln>
-        </p:spPr>
-        <p:txBody>
-          <a:bodyPr lIns="90000" rIns="90000" tIns="45000" bIns="45000"/>
-          <a:p>
-            <a:pPr>
-              <a:lnSpc>
-                <a:spcPct val="100000"/>
-              </a:lnSpc>
-            </a:pPr>
-            <a:r>
-              <a:rPr lang="pt-BR" sz="2000">
-                <a:solidFill>
-                  <a:srgbClr val="000000"/>
-                </a:solidFill>
-                <a:latin typeface="Garamond"/>
-              </a:rPr>
-              <a:t>Tutor do PET  SI </a:t>
-            </a:r>
-            <a:endParaRPr/>
-          </a:p>
-        </p:txBody>
-      </p:sp>
-      <p:sp>
-        <p:nvSpPr>
-          <p:cNvPr id="45" name="CustomShape 6"/>
-          <p:cNvSpPr/>
-          <p:nvPr/>
-        </p:nvSpPr>
-        <p:spPr>
-          <a:xfrm>
             <a:off x="0" y="2880000"/>
-            <a:ext cx="9143280" cy="431280"/>
+            <a:ext cx="9144000" cy="432000"/>
           </a:xfrm>
           <a:prstGeom prst="rect">
             <a:avLst/>
@@ -1694,168 +2319,14 @@
       </p:sp>
       <p:sp>
         <p:nvSpPr>
-          <p:cNvPr id="46" name="CustomShape 7"/>
+          <p:cNvPr id="30" name="CustomShape 10"/>
           <p:cNvSpPr/>
           <p:nvPr/>
         </p:nvSpPr>
         <p:spPr>
           <a:xfrm>
-            <a:off x="618480" y="3246480"/>
-            <a:ext cx="7775280" cy="912240"/>
-          </a:xfrm>
-          <a:prstGeom prst="rect">
-            <a:avLst/>
-          </a:prstGeom>
-          <a:noFill/>
-          <a:ln>
-            <a:noFill/>
-          </a:ln>
-        </p:spPr>
-        <p:txBody>
-          <a:bodyPr lIns="90000" rIns="90000" tIns="45000" bIns="45000"/>
-          <a:p>
-            <a:pPr algn="just">
-              <a:lnSpc>
-                <a:spcPct val="100000"/>
-              </a:lnSpc>
-            </a:pPr>
-            <a:r>
-              <a:rPr lang="pt-BR">
-                <a:solidFill>
-                  <a:srgbClr val="000000"/>
-                </a:solidFill>
-                <a:latin typeface="Garamond"/>
-              </a:rPr>
-              <a:t>participou do </a:t>
-            </a:r>
-            <a:r>
-              <a:rPr b="1" lang="pt-BR">
-                <a:solidFill>
-                  <a:srgbClr val="000000"/>
-                </a:solidFill>
-                <a:latin typeface="Garamond"/>
-              </a:rPr>
-              <a:t>V Workshop de Tecnologia da Informação do Sertão Central</a:t>
-            </a:r>
-            <a:r>
-              <a:rPr lang="pt-BR">
-                <a:solidFill>
-                  <a:srgbClr val="000000"/>
-                </a:solidFill>
-                <a:latin typeface="Garamond"/>
-              </a:rPr>
-              <a:t>, na atividade com o seguinte tema</a:t>
-            </a:r>
-            <a:endParaRPr/>
-          </a:p>
-          <a:p>
-            <a:pPr algn="just">
-              <a:lnSpc>
-                <a:spcPct val="100000"/>
-              </a:lnSpc>
-            </a:pPr>
-            <a:endParaRPr/>
-          </a:p>
-        </p:txBody>
-      </p:sp>
-      <p:sp>
-        <p:nvSpPr>
-          <p:cNvPr id="47" name="CustomShape 8"/>
-          <p:cNvSpPr/>
-          <p:nvPr/>
-        </p:nvSpPr>
-        <p:spPr>
-          <a:xfrm>
-            <a:off x="611640" y="4211640"/>
-            <a:ext cx="7775280" cy="637920"/>
-          </a:xfrm>
-          <a:prstGeom prst="rect">
-            <a:avLst/>
-          </a:prstGeom>
-          <a:noFill/>
-          <a:ln>
-            <a:noFill/>
-          </a:ln>
-        </p:spPr>
-        <p:txBody>
-          <a:bodyPr lIns="90000" rIns="90000" tIns="45000" bIns="45000"/>
-          <a:p>
-            <a:pPr algn="just">
-              <a:lnSpc>
-                <a:spcPct val="100000"/>
-              </a:lnSpc>
-            </a:pPr>
-            <a:r>
-              <a:rPr lang="pt-BR">
-                <a:solidFill>
-                  <a:srgbClr val="000000"/>
-                </a:solidFill>
-                <a:latin typeface="Garamond"/>
-              </a:rPr>
-              <a:t>no campus da Universidade Federal do Ceará em Quixadá</a:t>
-            </a:r>
-            <a:endParaRPr/>
-          </a:p>
-          <a:p>
-            <a:pPr algn="just">
-              <a:lnSpc>
-                <a:spcPct val="100000"/>
-              </a:lnSpc>
-            </a:pPr>
-            <a:endParaRPr/>
-          </a:p>
-        </p:txBody>
-      </p:sp>
-      <p:sp>
-        <p:nvSpPr>
-          <p:cNvPr id="48" name="CustomShape 9"/>
-          <p:cNvSpPr/>
-          <p:nvPr/>
-        </p:nvSpPr>
-        <p:spPr>
-          <a:xfrm>
-            <a:off x="432000" y="2367360"/>
-            <a:ext cx="7847280" cy="637920"/>
-          </a:xfrm>
-          <a:prstGeom prst="rect">
-            <a:avLst/>
-          </a:prstGeom>
-          <a:noFill/>
-          <a:ln>
-            <a:noFill/>
-          </a:ln>
-        </p:spPr>
-        <p:txBody>
-          <a:bodyPr lIns="90000" rIns="90000" tIns="45000" bIns="45000"/>
-          <a:p>
-            <a:pPr algn="just">
-              <a:lnSpc>
-                <a:spcPct val="100000"/>
-              </a:lnSpc>
-            </a:pPr>
-            <a:r>
-              <a:rPr lang="pt-BR">
-                <a:solidFill>
-                  <a:srgbClr val="000000"/>
-                </a:solidFill>
-                <a:latin typeface="Garamond"/>
-              </a:rPr>
-              <a:t>O Programa de Educação Tutorial – PET certifica que, entre os  dias 07 e 09 de maio de 2014,</a:t>
-            </a:r>
-            <a:endParaRPr/>
-          </a:p>
-        </p:txBody>
-      </p:sp>
-      <p:sp>
-        <p:nvSpPr>
-          <p:cNvPr id="49" name="CustomShape 10"/>
-          <p:cNvSpPr/>
-          <p:nvPr/>
-        </p:nvSpPr>
-        <p:spPr>
-          <a:xfrm>
             <a:off x="0" y="3816000"/>
-            <a:ext cx="9143280" cy="431280"/>
+            <a:ext cx="9144000" cy="432000"/>
           </a:xfrm>
           <a:prstGeom prst="rect">
             <a:avLst/>
@@ -1873,14 +2344,14 @@
       </p:sp>
       <p:sp>
         <p:nvSpPr>
-          <p:cNvPr id="50" name="CustomShape 11"/>
+          <p:cNvPr id="31" name="CustomShape 11"/>
           <p:cNvSpPr/>
           <p:nvPr/>
         </p:nvSpPr>
         <p:spPr>
           <a:xfrm>
             <a:off x="-720" y="4536000"/>
-            <a:ext cx="4608000" cy="611280"/>
+            <a:ext cx="4608720" cy="612000"/>
           </a:xfrm>
           <a:prstGeom prst="rect">
             <a:avLst/>
@@ -1898,14 +2369,14 @@
       </p:sp>
       <p:sp>
         <p:nvSpPr>
-          <p:cNvPr id="51" name="CustomShape 12"/>
+          <p:cNvPr id="32" name="CustomShape 11"/>
           <p:cNvSpPr/>
           <p:nvPr/>
         </p:nvSpPr>
         <p:spPr>
           <a:xfrm>
-            <a:off x="-720" y="6120000"/>
-            <a:ext cx="9144000" cy="738000"/>
+            <a:off x="-720" y="6002580"/>
+            <a:ext cx="4608720" cy="612000"/>
           </a:xfrm>
           <a:prstGeom prst="rect">
             <a:avLst/>
@@ -1923,6 +2394,9 @@
       </p:sp>
     </p:spTree>
   </p:cSld>
+  <p:clrMapOvr>
+    <a:masterClrMapping/>
+  </p:clrMapOvr>
   <p:timing>
     <p:tnLst>
       <p:par>
@@ -1931,14 +2405,14 @@
             <p:seq>
               <p:cTn id="2" nodeType="mainSeq"/>
               <p:prevCondLst>
-                <p:cond delay="0" evt="onPrev">
+                <p:cond evt="onPrev" delay="0">
                   <p:tgtEl>
                     <p:sldTgt/>
                   </p:tgtEl>
                 </p:cond>
               </p:prevCondLst>
               <p:nextCondLst>
-                <p:cond delay="0" evt="onNext">
+                <p:cond evt="onNext" delay="0">
                   <p:tgtEl>
                     <p:sldTgt/>
                   </p:tgtEl>
@@ -2173,5 +2647,7 @@
       </a:bgFillStyleLst>
     </a:fmtScheme>
   </a:themeElements>
+  <a:objectDefaults/>
+  <a:extraClrSchemeLst/>
 </a:theme>
 </file>
</xml_diff>